<commit_message>
Adição de imagens dos histogramas sobrepostos das instituições
</commit_message>
<xml_diff>
--- a/Enade/Comparativo Enade -2017.pptx
+++ b/Enade/Comparativo Enade -2017.pptx
@@ -12,10 +12,14 @@
     <p:sldId id="261" r:id="rId6"/>
     <p:sldId id="262" r:id="rId7"/>
     <p:sldId id="263" r:id="rId8"/>
-    <p:sldId id="264" r:id="rId9"/>
-    <p:sldId id="259" r:id="rId10"/>
-    <p:sldId id="260" r:id="rId11"/>
-    <p:sldId id="266" r:id="rId12"/>
+    <p:sldId id="267" r:id="rId9"/>
+    <p:sldId id="268" r:id="rId10"/>
+    <p:sldId id="269" r:id="rId11"/>
+    <p:sldId id="270" r:id="rId12"/>
+    <p:sldId id="264" r:id="rId13"/>
+    <p:sldId id="259" r:id="rId14"/>
+    <p:sldId id="260" r:id="rId15"/>
+    <p:sldId id="266" r:id="rId16"/>
   </p:sldIdLst>
   <p:sldSz cx="12192000" cy="6858000"/>
   <p:notesSz cx="6858000" cy="9144000"/>
@@ -114,6 +118,11 @@
       </a:defRPr>
     </a:lvl9pPr>
   </p:defaultTextStyle>
+  <p:extLst>
+    <p:ext uri="{EFAFB233-063F-42B5-8137-9DF3F51BA10A}">
+      <p15:sldGuideLst xmlns:p15="http://schemas.microsoft.com/office/powerpoint/2012/main"/>
+    </p:ext>
+  </p:extLst>
 </p:presentation>
 </file>
 
@@ -174,7 +183,7 @@
           <a:noFill/>
           <a:extLst>
             <a:ext uri="{909E8E84-426E-40dd-AFC4-6F175D3DCCD1}">
-              <a14:hiddenFill xmlns:a14="http://schemas.microsoft.com/office/drawing/2010/main" xmlns="">
+              <a14:hiddenFill xmlns="" xmlns:a14="http://schemas.microsoft.com/office/drawing/2010/main">
                 <a:solidFill>
                   <a:srgbClr val="FFFFFF"/>
                 </a:solidFill>
@@ -233,7 +242,7 @@
             </a:ln>
             <a:extLst>
               <a:ext uri="{91240B29-F687-4f45-9708-019B960494DF}">
-                <a14:hiddenLine xmlns:a14="http://schemas.microsoft.com/office/drawing/2010/main" xmlns="" w="9525">
+                <a14:hiddenLine xmlns="" xmlns:a14="http://schemas.microsoft.com/office/drawing/2010/main" w="9525">
                   <a:solidFill>
                     <a:srgbClr val="000000"/>
                   </a:solidFill>
@@ -323,7 +332,7 @@
             </a:ln>
             <a:extLst>
               <a:ext uri="{91240B29-F687-4f45-9708-019B960494DF}">
-                <a14:hiddenLine xmlns:a14="http://schemas.microsoft.com/office/drawing/2010/main" xmlns="" w="9525">
+                <a14:hiddenLine xmlns="" xmlns:a14="http://schemas.microsoft.com/office/drawing/2010/main" w="9525">
                   <a:solidFill>
                     <a:srgbClr val="000000"/>
                   </a:solidFill>
@@ -413,7 +422,7 @@
             </a:ln>
             <a:extLst>
               <a:ext uri="{91240B29-F687-4f45-9708-019B960494DF}">
-                <a14:hiddenLine xmlns:a14="http://schemas.microsoft.com/office/drawing/2010/main" xmlns="" w="9525">
+                <a14:hiddenLine xmlns="" xmlns:a14="http://schemas.microsoft.com/office/drawing/2010/main" w="9525">
                   <a:solidFill>
                     <a:srgbClr val="000000"/>
                   </a:solidFill>
@@ -447,7 +456,7 @@
             </a:ln>
             <a:extLst>
               <a:ext uri="{91240B29-F687-4f45-9708-019B960494DF}">
-                <a14:hiddenLine xmlns:a14="http://schemas.microsoft.com/office/drawing/2010/main" xmlns="" w="9525">
+                <a14:hiddenLine xmlns="" xmlns:a14="http://schemas.microsoft.com/office/drawing/2010/main" w="9525">
                   <a:solidFill>
                     <a:srgbClr val="000000"/>
                   </a:solidFill>
@@ -537,7 +546,7 @@
             </a:ln>
             <a:extLst>
               <a:ext uri="{91240B29-F687-4f45-9708-019B960494DF}">
-                <a14:hiddenLine xmlns:a14="http://schemas.microsoft.com/office/drawing/2010/main" xmlns="" w="9525">
+                <a14:hiddenLine xmlns="" xmlns:a14="http://schemas.microsoft.com/office/drawing/2010/main" w="9525">
                   <a:solidFill>
                     <a:srgbClr val="000000"/>
                   </a:solidFill>
@@ -599,7 +608,7 @@
             </a:ln>
             <a:extLst>
               <a:ext uri="{91240B29-F687-4f45-9708-019B960494DF}">
-                <a14:hiddenLine xmlns:a14="http://schemas.microsoft.com/office/drawing/2010/main" xmlns="" w="9525">
+                <a14:hiddenLine xmlns="" xmlns:a14="http://schemas.microsoft.com/office/drawing/2010/main" w="9525">
                   <a:solidFill>
                     <a:srgbClr val="000000"/>
                   </a:solidFill>
@@ -661,7 +670,7 @@
             </a:ln>
             <a:extLst>
               <a:ext uri="{91240B29-F687-4f45-9708-019B960494DF}">
-                <a14:hiddenLine xmlns:a14="http://schemas.microsoft.com/office/drawing/2010/main" xmlns="" w="9525">
+                <a14:hiddenLine xmlns="" xmlns:a14="http://schemas.microsoft.com/office/drawing/2010/main" w="9525">
                   <a:solidFill>
                     <a:srgbClr val="000000"/>
                   </a:solidFill>
@@ -751,7 +760,7 @@
             </a:ln>
             <a:extLst>
               <a:ext uri="{91240B29-F687-4f45-9708-019B960494DF}">
-                <a14:hiddenLine xmlns:a14="http://schemas.microsoft.com/office/drawing/2010/main" xmlns="" w="9525">
+                <a14:hiddenLine xmlns="" xmlns:a14="http://schemas.microsoft.com/office/drawing/2010/main" w="9525">
                   <a:solidFill>
                     <a:srgbClr val="000000"/>
                   </a:solidFill>
@@ -813,7 +822,7 @@
             </a:ln>
             <a:extLst>
               <a:ext uri="{91240B29-F687-4f45-9708-019B960494DF}">
-                <a14:hiddenLine xmlns:a14="http://schemas.microsoft.com/office/drawing/2010/main" xmlns="" w="9525">
+                <a14:hiddenLine xmlns="" xmlns:a14="http://schemas.microsoft.com/office/drawing/2010/main" w="9525">
                   <a:solidFill>
                     <a:srgbClr val="000000"/>
                   </a:solidFill>
@@ -875,7 +884,7 @@
             </a:ln>
             <a:extLst>
               <a:ext uri="{91240B29-F687-4f45-9708-019B960494DF}">
-                <a14:hiddenLine xmlns:a14="http://schemas.microsoft.com/office/drawing/2010/main" xmlns="" w="9525">
+                <a14:hiddenLine xmlns="" xmlns:a14="http://schemas.microsoft.com/office/drawing/2010/main" w="9525">
                   <a:solidFill>
                     <a:srgbClr val="000000"/>
                   </a:solidFill>
@@ -965,7 +974,7 @@
             </a:ln>
             <a:extLst>
               <a:ext uri="{91240B29-F687-4f45-9708-019B960494DF}">
-                <a14:hiddenLine xmlns:a14="http://schemas.microsoft.com/office/drawing/2010/main" xmlns="" w="9525">
+                <a14:hiddenLine xmlns="" xmlns:a14="http://schemas.microsoft.com/office/drawing/2010/main" w="9525">
                   <a:solidFill>
                     <a:srgbClr val="000000"/>
                   </a:solidFill>
@@ -1055,7 +1064,7 @@
             </a:ln>
             <a:extLst>
               <a:ext uri="{91240B29-F687-4f45-9708-019B960494DF}">
-                <a14:hiddenLine xmlns:a14="http://schemas.microsoft.com/office/drawing/2010/main" xmlns="" w="9525">
+                <a14:hiddenLine xmlns="" xmlns:a14="http://schemas.microsoft.com/office/drawing/2010/main" w="9525">
                   <a:solidFill>
                     <a:srgbClr val="000000"/>
                   </a:solidFill>
@@ -1117,7 +1126,7 @@
             </a:ln>
             <a:extLst>
               <a:ext uri="{91240B29-F687-4f45-9708-019B960494DF}">
-                <a14:hiddenLine xmlns:a14="http://schemas.microsoft.com/office/drawing/2010/main" xmlns="" w="9525">
+                <a14:hiddenLine xmlns="" xmlns:a14="http://schemas.microsoft.com/office/drawing/2010/main" w="9525">
                   <a:solidFill>
                     <a:srgbClr val="000000"/>
                   </a:solidFill>
@@ -1227,7 +1236,7 @@
             </a:ln>
             <a:extLst>
               <a:ext uri="{91240B29-F687-4f45-9708-019B960494DF}">
-                <a14:hiddenLine xmlns:a14="http://schemas.microsoft.com/office/drawing/2010/main" xmlns="" w="9525">
+                <a14:hiddenLine xmlns="" xmlns:a14="http://schemas.microsoft.com/office/drawing/2010/main" w="9525">
                   <a:solidFill>
                     <a:srgbClr val="000000"/>
                   </a:solidFill>
@@ -1289,7 +1298,7 @@
             </a:ln>
             <a:extLst>
               <a:ext uri="{91240B29-F687-4f45-9708-019B960494DF}">
-                <a14:hiddenLine xmlns:a14="http://schemas.microsoft.com/office/drawing/2010/main" xmlns="" w="9525">
+                <a14:hiddenLine xmlns="" xmlns:a14="http://schemas.microsoft.com/office/drawing/2010/main" w="9525">
                   <a:solidFill>
                     <a:srgbClr val="000000"/>
                   </a:solidFill>
@@ -1379,7 +1388,7 @@
             </a:ln>
             <a:extLst>
               <a:ext uri="{91240B29-F687-4f45-9708-019B960494DF}">
-                <a14:hiddenLine xmlns:a14="http://schemas.microsoft.com/office/drawing/2010/main" xmlns="" w="9525">
+                <a14:hiddenLine xmlns="" xmlns:a14="http://schemas.microsoft.com/office/drawing/2010/main" w="9525">
                   <a:solidFill>
                     <a:srgbClr val="000000"/>
                   </a:solidFill>
@@ -1469,7 +1478,7 @@
             </a:ln>
             <a:extLst>
               <a:ext uri="{91240B29-F687-4f45-9708-019B960494DF}">
-                <a14:hiddenLine xmlns:a14="http://schemas.microsoft.com/office/drawing/2010/main" xmlns="" w="9525">
+                <a14:hiddenLine xmlns="" xmlns:a14="http://schemas.microsoft.com/office/drawing/2010/main" w="9525">
                   <a:solidFill>
                     <a:srgbClr val="000000"/>
                   </a:solidFill>
@@ -1531,7 +1540,7 @@
             </a:ln>
             <a:extLst>
               <a:ext uri="{91240B29-F687-4f45-9708-019B960494DF}">
-                <a14:hiddenLine xmlns:a14="http://schemas.microsoft.com/office/drawing/2010/main" xmlns="" w="9525">
+                <a14:hiddenLine xmlns="" xmlns:a14="http://schemas.microsoft.com/office/drawing/2010/main" w="9525">
                   <a:solidFill>
                     <a:srgbClr val="000000"/>
                   </a:solidFill>
@@ -1621,7 +1630,7 @@
             </a:ln>
             <a:extLst>
               <a:ext uri="{91240B29-F687-4f45-9708-019B960494DF}">
-                <a14:hiddenLine xmlns:a14="http://schemas.microsoft.com/office/drawing/2010/main" xmlns="" w="9525">
+                <a14:hiddenLine xmlns="" xmlns:a14="http://schemas.microsoft.com/office/drawing/2010/main" w="9525">
                   <a:solidFill>
                     <a:srgbClr val="000000"/>
                   </a:solidFill>
@@ -1711,7 +1720,7 @@
             </a:ln>
             <a:extLst>
               <a:ext uri="{91240B29-F687-4f45-9708-019B960494DF}">
-                <a14:hiddenLine xmlns:a14="http://schemas.microsoft.com/office/drawing/2010/main" xmlns="" w="9525">
+                <a14:hiddenLine xmlns="" xmlns:a14="http://schemas.microsoft.com/office/drawing/2010/main" w="9525">
                   <a:solidFill>
                     <a:srgbClr val="000000"/>
                   </a:solidFill>
@@ -1767,7 +1776,7 @@
             </a:ln>
             <a:extLst>
               <a:ext uri="{91240B29-F687-4f45-9708-019B960494DF}">
-                <a14:hiddenLine xmlns:a14="http://schemas.microsoft.com/office/drawing/2010/main" xmlns="" w="9525">
+                <a14:hiddenLine xmlns="" xmlns:a14="http://schemas.microsoft.com/office/drawing/2010/main" w="9525">
                   <a:solidFill>
                     <a:srgbClr val="000000"/>
                   </a:solidFill>
@@ -1857,7 +1866,7 @@
             </a:ln>
             <a:extLst>
               <a:ext uri="{91240B29-F687-4f45-9708-019B960494DF}">
-                <a14:hiddenLine xmlns:a14="http://schemas.microsoft.com/office/drawing/2010/main" xmlns="" w="9525">
+                <a14:hiddenLine xmlns="" xmlns:a14="http://schemas.microsoft.com/office/drawing/2010/main" w="9525">
                   <a:solidFill>
                     <a:srgbClr val="000000"/>
                   </a:solidFill>
@@ -1913,7 +1922,7 @@
             </a:ln>
             <a:extLst>
               <a:ext uri="{91240B29-F687-4f45-9708-019B960494DF}">
-                <a14:hiddenLine xmlns:a14="http://schemas.microsoft.com/office/drawing/2010/main" xmlns="" w="9525">
+                <a14:hiddenLine xmlns="" xmlns:a14="http://schemas.microsoft.com/office/drawing/2010/main" w="9525">
                   <a:solidFill>
                     <a:srgbClr val="000000"/>
                   </a:solidFill>
@@ -2003,7 +2012,7 @@
             </a:ln>
             <a:extLst>
               <a:ext uri="{91240B29-F687-4f45-9708-019B960494DF}">
-                <a14:hiddenLine xmlns:a14="http://schemas.microsoft.com/office/drawing/2010/main" xmlns="" w="9525">
+                <a14:hiddenLine xmlns="" xmlns:a14="http://schemas.microsoft.com/office/drawing/2010/main" w="9525">
                   <a:solidFill>
                     <a:srgbClr val="000000"/>
                   </a:solidFill>
@@ -2071,7 +2080,7 @@
             </a:ln>
             <a:extLst>
               <a:ext uri="{91240B29-F687-4f45-9708-019B960494DF}">
-                <a14:hiddenLine xmlns:a14="http://schemas.microsoft.com/office/drawing/2010/main" xmlns="" w="9525">
+                <a14:hiddenLine xmlns="" xmlns:a14="http://schemas.microsoft.com/office/drawing/2010/main" w="9525">
                   <a:solidFill>
                     <a:srgbClr val="000000"/>
                   </a:solidFill>
@@ -2161,7 +2170,7 @@
             </a:ln>
             <a:extLst>
               <a:ext uri="{91240B29-F687-4f45-9708-019B960494DF}">
-                <a14:hiddenLine xmlns:a14="http://schemas.microsoft.com/office/drawing/2010/main" xmlns="" w="9525">
+                <a14:hiddenLine xmlns="" xmlns:a14="http://schemas.microsoft.com/office/drawing/2010/main" w="9525">
                   <a:solidFill>
                     <a:srgbClr val="000000"/>
                   </a:solidFill>
@@ -2229,7 +2238,7 @@
             </a:ln>
             <a:extLst>
               <a:ext uri="{91240B29-F687-4f45-9708-019B960494DF}">
-                <a14:hiddenLine xmlns:a14="http://schemas.microsoft.com/office/drawing/2010/main" xmlns="" w="9525">
+                <a14:hiddenLine xmlns="" xmlns:a14="http://schemas.microsoft.com/office/drawing/2010/main" w="9525">
                   <a:solidFill>
                     <a:srgbClr val="000000"/>
                   </a:solidFill>
@@ -2319,7 +2328,7 @@
             </a:ln>
             <a:extLst>
               <a:ext uri="{91240B29-F687-4f45-9708-019B960494DF}">
-                <a14:hiddenLine xmlns:a14="http://schemas.microsoft.com/office/drawing/2010/main" xmlns="" w="9525">
+                <a14:hiddenLine xmlns="" xmlns:a14="http://schemas.microsoft.com/office/drawing/2010/main" w="9525">
                   <a:solidFill>
                     <a:srgbClr val="000000"/>
                   </a:solidFill>
@@ -2353,7 +2362,7 @@
             </a:ln>
             <a:extLst>
               <a:ext uri="{91240B29-F687-4f45-9708-019B960494DF}">
-                <a14:hiddenLine xmlns:a14="http://schemas.microsoft.com/office/drawing/2010/main" xmlns="" w="9525">
+                <a14:hiddenLine xmlns="" xmlns:a14="http://schemas.microsoft.com/office/drawing/2010/main" w="9525">
                   <a:solidFill>
                     <a:srgbClr val="000000"/>
                   </a:solidFill>
@@ -2443,7 +2452,7 @@
             </a:ln>
             <a:extLst>
               <a:ext uri="{91240B29-F687-4f45-9708-019B960494DF}">
-                <a14:hiddenLine xmlns:a14="http://schemas.microsoft.com/office/drawing/2010/main" xmlns="" w="9525">
+                <a14:hiddenLine xmlns="" xmlns:a14="http://schemas.microsoft.com/office/drawing/2010/main" w="9525">
                   <a:solidFill>
                     <a:srgbClr val="000000"/>
                   </a:solidFill>
@@ -2505,7 +2514,7 @@
             </a:ln>
             <a:extLst>
               <a:ext uri="{91240B29-F687-4f45-9708-019B960494DF}">
-                <a14:hiddenLine xmlns:a14="http://schemas.microsoft.com/office/drawing/2010/main" xmlns="" w="9525">
+                <a14:hiddenLine xmlns="" xmlns:a14="http://schemas.microsoft.com/office/drawing/2010/main" w="9525">
                   <a:solidFill>
                     <a:srgbClr val="000000"/>
                   </a:solidFill>
@@ -2567,7 +2576,7 @@
             </a:ln>
             <a:extLst>
               <a:ext uri="{91240B29-F687-4f45-9708-019B960494DF}">
-                <a14:hiddenLine xmlns:a14="http://schemas.microsoft.com/office/drawing/2010/main" xmlns="" w="9525">
+                <a14:hiddenLine xmlns="" xmlns:a14="http://schemas.microsoft.com/office/drawing/2010/main" w="9525">
                   <a:solidFill>
                     <a:srgbClr val="000000"/>
                   </a:solidFill>
@@ -2657,7 +2666,7 @@
             </a:ln>
             <a:extLst>
               <a:ext uri="{91240B29-F687-4f45-9708-019B960494DF}">
-                <a14:hiddenLine xmlns:a14="http://schemas.microsoft.com/office/drawing/2010/main" xmlns="" w="9525">
+                <a14:hiddenLine xmlns="" xmlns:a14="http://schemas.microsoft.com/office/drawing/2010/main" w="9525">
                   <a:solidFill>
                     <a:srgbClr val="000000"/>
                   </a:solidFill>
@@ -2725,7 +2734,7 @@
             </a:ln>
             <a:extLst>
               <a:ext uri="{91240B29-F687-4f45-9708-019B960494DF}">
-                <a14:hiddenLine xmlns:a14="http://schemas.microsoft.com/office/drawing/2010/main" xmlns="" w="9525">
+                <a14:hiddenLine xmlns="" xmlns:a14="http://schemas.microsoft.com/office/drawing/2010/main" w="9525">
                   <a:solidFill>
                     <a:srgbClr val="000000"/>
                   </a:solidFill>
@@ -2787,7 +2796,7 @@
             </a:ln>
             <a:extLst>
               <a:ext uri="{91240B29-F687-4f45-9708-019B960494DF}">
-                <a14:hiddenLine xmlns:a14="http://schemas.microsoft.com/office/drawing/2010/main" xmlns="" w="9525">
+                <a14:hiddenLine xmlns="" xmlns:a14="http://schemas.microsoft.com/office/drawing/2010/main" w="9525">
                   <a:solidFill>
                     <a:srgbClr val="000000"/>
                   </a:solidFill>
@@ -2877,7 +2886,7 @@
             </a:ln>
             <a:extLst>
               <a:ext uri="{91240B29-F687-4f45-9708-019B960494DF}">
-                <a14:hiddenLine xmlns:a14="http://schemas.microsoft.com/office/drawing/2010/main" xmlns="" w="9525">
+                <a14:hiddenLine xmlns="" xmlns:a14="http://schemas.microsoft.com/office/drawing/2010/main" w="9525">
                   <a:solidFill>
                     <a:srgbClr val="000000"/>
                   </a:solidFill>
@@ -2939,7 +2948,7 @@
             </a:ln>
             <a:extLst>
               <a:ext uri="{91240B29-F687-4f45-9708-019B960494DF}">
-                <a14:hiddenLine xmlns:a14="http://schemas.microsoft.com/office/drawing/2010/main" xmlns="" w="9525">
+                <a14:hiddenLine xmlns="" xmlns:a14="http://schemas.microsoft.com/office/drawing/2010/main" w="9525">
                   <a:solidFill>
                     <a:srgbClr val="000000"/>
                   </a:solidFill>
@@ -3029,7 +3038,7 @@
             </a:ln>
             <a:extLst>
               <a:ext uri="{91240B29-F687-4f45-9708-019B960494DF}">
-                <a14:hiddenLine xmlns:a14="http://schemas.microsoft.com/office/drawing/2010/main" xmlns="" w="9525">
+                <a14:hiddenLine xmlns="" xmlns:a14="http://schemas.microsoft.com/office/drawing/2010/main" w="9525">
                   <a:solidFill>
                     <a:srgbClr val="000000"/>
                   </a:solidFill>
@@ -3091,7 +3100,7 @@
             </a:ln>
             <a:extLst>
               <a:ext uri="{91240B29-F687-4f45-9708-019B960494DF}">
-                <a14:hiddenLine xmlns:a14="http://schemas.microsoft.com/office/drawing/2010/main" xmlns="" w="9525">
+                <a14:hiddenLine xmlns="" xmlns:a14="http://schemas.microsoft.com/office/drawing/2010/main" w="9525">
                   <a:solidFill>
                     <a:srgbClr val="000000"/>
                   </a:solidFill>
@@ -3181,7 +3190,7 @@
             </a:ln>
             <a:extLst>
               <a:ext uri="{91240B29-F687-4f45-9708-019B960494DF}">
-                <a14:hiddenLine xmlns:a14="http://schemas.microsoft.com/office/drawing/2010/main" xmlns="" w="9525">
+                <a14:hiddenLine xmlns="" xmlns:a14="http://schemas.microsoft.com/office/drawing/2010/main" w="9525">
                   <a:solidFill>
                     <a:srgbClr val="000000"/>
                   </a:solidFill>
@@ -3215,7 +3224,7 @@
             </a:ln>
             <a:extLst>
               <a:ext uri="{91240B29-F687-4f45-9708-019B960494DF}">
-                <a14:hiddenLine xmlns:a14="http://schemas.microsoft.com/office/drawing/2010/main" xmlns="" w="9525">
+                <a14:hiddenLine xmlns="" xmlns:a14="http://schemas.microsoft.com/office/drawing/2010/main" w="9525">
                   <a:solidFill>
                     <a:srgbClr val="000000"/>
                   </a:solidFill>
@@ -3280,7 +3289,7 @@
             </a:ln>
             <a:extLst>
               <a:ext uri="{91240B29-F687-4f45-9708-019B960494DF}">
-                <a14:hiddenLine xmlns:a14="http://schemas.microsoft.com/office/drawing/2010/main" xmlns="" w="9525">
+                <a14:hiddenLine xmlns="" xmlns:a14="http://schemas.microsoft.com/office/drawing/2010/main" w="9525">
                   <a:solidFill>
                     <a:srgbClr val="000000"/>
                   </a:solidFill>
@@ -3370,7 +3379,7 @@
             </a:ln>
             <a:extLst>
               <a:ext uri="{91240B29-F687-4f45-9708-019B960494DF}">
-                <a14:hiddenLine xmlns:a14="http://schemas.microsoft.com/office/drawing/2010/main" xmlns="" w="9525">
+                <a14:hiddenLine xmlns="" xmlns:a14="http://schemas.microsoft.com/office/drawing/2010/main" w="9525">
                   <a:solidFill>
                     <a:srgbClr val="000000"/>
                   </a:solidFill>
@@ -3432,7 +3441,7 @@
             </a:ln>
             <a:extLst>
               <a:ext uri="{91240B29-F687-4f45-9708-019B960494DF}">
-                <a14:hiddenLine xmlns:a14="http://schemas.microsoft.com/office/drawing/2010/main" xmlns="" w="9525">
+                <a14:hiddenLine xmlns="" xmlns:a14="http://schemas.microsoft.com/office/drawing/2010/main" w="9525">
                   <a:solidFill>
                     <a:srgbClr val="000000"/>
                   </a:solidFill>
@@ -3522,7 +3531,7 @@
             </a:ln>
             <a:extLst>
               <a:ext uri="{91240B29-F687-4f45-9708-019B960494DF}">
-                <a14:hiddenLine xmlns:a14="http://schemas.microsoft.com/office/drawing/2010/main" xmlns="" w="9525">
+                <a14:hiddenLine xmlns="" xmlns:a14="http://schemas.microsoft.com/office/drawing/2010/main" w="9525">
                   <a:solidFill>
                     <a:srgbClr val="000000"/>
                   </a:solidFill>
@@ -3612,7 +3621,7 @@
             </a:ln>
             <a:extLst>
               <a:ext uri="{91240B29-F687-4f45-9708-019B960494DF}">
-                <a14:hiddenLine xmlns:a14="http://schemas.microsoft.com/office/drawing/2010/main" xmlns="" w="9525">
+                <a14:hiddenLine xmlns="" xmlns:a14="http://schemas.microsoft.com/office/drawing/2010/main" w="9525">
                   <a:solidFill>
                     <a:srgbClr val="000000"/>
                   </a:solidFill>
@@ -3677,7 +3686,7 @@
             </a:ln>
             <a:extLst>
               <a:ext uri="{91240B29-F687-4f45-9708-019B960494DF}">
-                <a14:hiddenLine xmlns:a14="http://schemas.microsoft.com/office/drawing/2010/main" xmlns="" w="9525">
+                <a14:hiddenLine xmlns="" xmlns:a14="http://schemas.microsoft.com/office/drawing/2010/main" w="9525">
                   <a:solidFill>
                     <a:srgbClr val="000000"/>
                   </a:solidFill>
@@ -3739,7 +3748,7 @@
             </a:ln>
             <a:extLst>
               <a:ext uri="{91240B29-F687-4f45-9708-019B960494DF}">
-                <a14:hiddenLine xmlns:a14="http://schemas.microsoft.com/office/drawing/2010/main" xmlns="" w="9525">
+                <a14:hiddenLine xmlns="" xmlns:a14="http://schemas.microsoft.com/office/drawing/2010/main" w="9525">
                   <a:solidFill>
                     <a:srgbClr val="000000"/>
                   </a:solidFill>
@@ -3829,7 +3838,7 @@
             </a:ln>
             <a:extLst>
               <a:ext uri="{91240B29-F687-4f45-9708-019B960494DF}">
-                <a14:hiddenLine xmlns:a14="http://schemas.microsoft.com/office/drawing/2010/main" xmlns="" w="9525">
+                <a14:hiddenLine xmlns="" xmlns:a14="http://schemas.microsoft.com/office/drawing/2010/main" w="9525">
                   <a:solidFill>
                     <a:srgbClr val="000000"/>
                   </a:solidFill>
@@ -3919,7 +3928,7 @@
             </a:ln>
             <a:extLst>
               <a:ext uri="{91240B29-F687-4f45-9708-019B960494DF}">
-                <a14:hiddenLine xmlns:a14="http://schemas.microsoft.com/office/drawing/2010/main" xmlns="" w="9525">
+                <a14:hiddenLine xmlns="" xmlns:a14="http://schemas.microsoft.com/office/drawing/2010/main" w="9525">
                   <a:solidFill>
                     <a:srgbClr val="000000"/>
                   </a:solidFill>
@@ -3981,7 +3990,7 @@
             </a:ln>
             <a:extLst>
               <a:ext uri="{91240B29-F687-4f45-9708-019B960494DF}">
-                <a14:hiddenLine xmlns:a14="http://schemas.microsoft.com/office/drawing/2010/main" xmlns="" w="9525">
+                <a14:hiddenLine xmlns="" xmlns:a14="http://schemas.microsoft.com/office/drawing/2010/main" w="9525">
                   <a:solidFill>
                     <a:srgbClr val="000000"/>
                   </a:solidFill>
@@ -4101,7 +4110,7 @@
             </a:ln>
             <a:extLst>
               <a:ext uri="{91240B29-F687-4f45-9708-019B960494DF}">
-                <a14:hiddenLine xmlns:a14="http://schemas.microsoft.com/office/drawing/2010/main" xmlns="" w="9525">
+                <a14:hiddenLine xmlns="" xmlns:a14="http://schemas.microsoft.com/office/drawing/2010/main" w="9525">
                   <a:solidFill>
                     <a:srgbClr val="000000"/>
                   </a:solidFill>
@@ -4169,7 +4178,7 @@
             </a:ln>
             <a:extLst>
               <a:ext uri="{91240B29-F687-4f45-9708-019B960494DF}">
-                <a14:hiddenLine xmlns:a14="http://schemas.microsoft.com/office/drawing/2010/main" xmlns="" w="9525">
+                <a14:hiddenLine xmlns="" xmlns:a14="http://schemas.microsoft.com/office/drawing/2010/main" w="9525">
                   <a:solidFill>
                     <a:srgbClr val="000000"/>
                   </a:solidFill>
@@ -4259,7 +4268,7 @@
             </a:ln>
             <a:extLst>
               <a:ext uri="{91240B29-F687-4f45-9708-019B960494DF}">
-                <a14:hiddenLine xmlns:a14="http://schemas.microsoft.com/office/drawing/2010/main" xmlns="" w="9525">
+                <a14:hiddenLine xmlns="" xmlns:a14="http://schemas.microsoft.com/office/drawing/2010/main" w="9525">
                   <a:solidFill>
                     <a:srgbClr val="000000"/>
                   </a:solidFill>
@@ -4399,7 +4408,7 @@
           <a:p>
             <a:fld id="{48A87A34-81AB-432B-8DAE-1953F412C126}" type="datetimeFigureOut">
               <a:rPr lang="en-US" smtClean="0"/>
-              <a:t>10/26/2018</a:t>
+              <a:t>10/30/2018</a:t>
             </a:fld>
             <a:endParaRPr lang="en-US" dirty="0"/>
           </a:p>
@@ -4666,7 +4675,7 @@
           <a:p>
             <a:fld id="{48A87A34-81AB-432B-8DAE-1953F412C126}" type="datetimeFigureOut">
               <a:rPr lang="en-US" smtClean="0"/>
-              <a:t>10/26/2018</a:t>
+              <a:t>10/30/2018</a:t>
             </a:fld>
             <a:endParaRPr lang="en-US" dirty="0"/>
           </a:p>
@@ -4862,7 +4871,7 @@
           <a:p>
             <a:fld id="{48A87A34-81AB-432B-8DAE-1953F412C126}" type="datetimeFigureOut">
               <a:rPr lang="en-US" smtClean="0"/>
-              <a:t>10/26/2018</a:t>
+              <a:t>10/30/2018</a:t>
             </a:fld>
             <a:endParaRPr lang="en-US" dirty="0"/>
           </a:p>
@@ -5125,7 +5134,7 @@
           <a:p>
             <a:fld id="{48A87A34-81AB-432B-8DAE-1953F412C126}" type="datetimeFigureOut">
               <a:rPr lang="en-US" smtClean="0"/>
-              <a:t>10/26/2018</a:t>
+              <a:t>10/30/2018</a:t>
             </a:fld>
             <a:endParaRPr lang="en-US" dirty="0"/>
           </a:p>
@@ -5559,7 +5568,7 @@
           <a:p>
             <a:fld id="{48A87A34-81AB-432B-8DAE-1953F412C126}" type="datetimeFigureOut">
               <a:rPr lang="en-US" smtClean="0"/>
-              <a:t>10/26/2018</a:t>
+              <a:t>10/30/2018</a:t>
             </a:fld>
             <a:endParaRPr lang="en-US" dirty="0"/>
           </a:p>
@@ -6105,7 +6114,7 @@
           <a:p>
             <a:fld id="{48A87A34-81AB-432B-8DAE-1953F412C126}" type="datetimeFigureOut">
               <a:rPr lang="en-US" smtClean="0"/>
-              <a:t>10/26/2018</a:t>
+              <a:t>10/30/2018</a:t>
             </a:fld>
             <a:endParaRPr lang="en-US" dirty="0"/>
           </a:p>
@@ -6825,7 +6834,7 @@
           <a:p>
             <a:fld id="{48A87A34-81AB-432B-8DAE-1953F412C126}" type="datetimeFigureOut">
               <a:rPr lang="en-US" smtClean="0"/>
-              <a:t>10/26/2018</a:t>
+              <a:t>10/30/2018</a:t>
             </a:fld>
             <a:endParaRPr lang="en-US" dirty="0"/>
           </a:p>
@@ -6995,7 +7004,7 @@
           <a:p>
             <a:fld id="{48A87A34-81AB-432B-8DAE-1953F412C126}" type="datetimeFigureOut">
               <a:rPr lang="en-US" smtClean="0"/>
-              <a:t>10/26/2018</a:t>
+              <a:t>10/30/2018</a:t>
             </a:fld>
             <a:endParaRPr lang="en-US" dirty="0"/>
           </a:p>
@@ -7175,7 +7184,7 @@
           <a:p>
             <a:fld id="{48A87A34-81AB-432B-8DAE-1953F412C126}" type="datetimeFigureOut">
               <a:rPr lang="en-US" smtClean="0"/>
-              <a:t>10/26/2018</a:t>
+              <a:t>10/30/2018</a:t>
             </a:fld>
             <a:endParaRPr lang="en-US" dirty="0"/>
           </a:p>
@@ -7345,7 +7354,7 @@
           <a:p>
             <a:fld id="{48A87A34-81AB-432B-8DAE-1953F412C126}" type="datetimeFigureOut">
               <a:rPr lang="en-US" smtClean="0"/>
-              <a:t>10/26/2018</a:t>
+              <a:t>10/30/2018</a:t>
             </a:fld>
             <a:endParaRPr lang="en-US" dirty="0"/>
           </a:p>
@@ -7595,7 +7604,7 @@
           <a:p>
             <a:fld id="{48A87A34-81AB-432B-8DAE-1953F412C126}" type="datetimeFigureOut">
               <a:rPr lang="en-US" smtClean="0"/>
-              <a:t>10/26/2018</a:t>
+              <a:t>10/30/2018</a:t>
             </a:fld>
             <a:endParaRPr lang="en-US" dirty="0"/>
           </a:p>
@@ -7827,7 +7836,7 @@
           <a:p>
             <a:fld id="{48A87A34-81AB-432B-8DAE-1953F412C126}" type="datetimeFigureOut">
               <a:rPr lang="en-US" smtClean="0"/>
-              <a:t>10/26/2018</a:t>
+              <a:t>10/30/2018</a:t>
             </a:fld>
             <a:endParaRPr lang="en-US" dirty="0"/>
           </a:p>
@@ -8208,7 +8217,7 @@
           <a:p>
             <a:fld id="{48A87A34-81AB-432B-8DAE-1953F412C126}" type="datetimeFigureOut">
               <a:rPr lang="en-US" smtClean="0"/>
-              <a:t>10/26/2018</a:t>
+              <a:t>10/30/2018</a:t>
             </a:fld>
             <a:endParaRPr lang="en-US" dirty="0"/>
           </a:p>
@@ -8326,7 +8335,7 @@
           <a:p>
             <a:fld id="{48A87A34-81AB-432B-8DAE-1953F412C126}" type="datetimeFigureOut">
               <a:rPr lang="en-US" smtClean="0"/>
-              <a:t>10/26/2018</a:t>
+              <a:t>10/30/2018</a:t>
             </a:fld>
             <a:endParaRPr lang="en-US" dirty="0"/>
           </a:p>
@@ -8421,7 +8430,7 @@
           <a:p>
             <a:fld id="{48A87A34-81AB-432B-8DAE-1953F412C126}" type="datetimeFigureOut">
               <a:rPr lang="en-US" smtClean="0"/>
-              <a:t>10/26/2018</a:t>
+              <a:t>10/30/2018</a:t>
             </a:fld>
             <a:endParaRPr lang="en-US" dirty="0"/>
           </a:p>
@@ -8670,7 +8679,7 @@
           <a:p>
             <a:fld id="{48A87A34-81AB-432B-8DAE-1953F412C126}" type="datetimeFigureOut">
               <a:rPr lang="en-US" smtClean="0"/>
-              <a:t>10/26/2018</a:t>
+              <a:t>10/30/2018</a:t>
             </a:fld>
             <a:endParaRPr lang="en-US" dirty="0"/>
           </a:p>
@@ -8950,7 +8959,7 @@
           <a:p>
             <a:fld id="{48A87A34-81AB-432B-8DAE-1953F412C126}" type="datetimeFigureOut">
               <a:rPr lang="en-US" smtClean="0"/>
-              <a:t>10/26/2018</a:t>
+              <a:t>10/30/2018</a:t>
             </a:fld>
             <a:endParaRPr lang="en-US" dirty="0"/>
           </a:p>
@@ -9073,7 +9082,7 @@
           <a:noFill/>
           <a:extLst>
             <a:ext uri="{909E8E84-426E-40dd-AFC4-6F175D3DCCD1}">
-              <a14:hiddenFill xmlns:a14="http://schemas.microsoft.com/office/drawing/2010/main" xmlns="">
+              <a14:hiddenFill xmlns="" xmlns:a14="http://schemas.microsoft.com/office/drawing/2010/main">
                 <a:solidFill>
                   <a:srgbClr val="FFFFFF"/>
                 </a:solidFill>
@@ -9147,7 +9156,7 @@
               </a:ln>
               <a:extLst>
                 <a:ext uri="{91240B29-F687-4f45-9708-019B960494DF}">
-                  <a14:hiddenLine xmlns:a14="http://schemas.microsoft.com/office/drawing/2010/main" xmlns="" w="9525">
+                  <a14:hiddenLine xmlns="" xmlns:a14="http://schemas.microsoft.com/office/drawing/2010/main" w="9525">
                     <a:solidFill>
                       <a:srgbClr val="000000"/>
                     </a:solidFill>
@@ -9237,7 +9246,7 @@
               </a:ln>
               <a:extLst>
                 <a:ext uri="{91240B29-F687-4f45-9708-019B960494DF}">
-                  <a14:hiddenLine xmlns:a14="http://schemas.microsoft.com/office/drawing/2010/main" xmlns="" w="9525">
+                  <a14:hiddenLine xmlns="" xmlns:a14="http://schemas.microsoft.com/office/drawing/2010/main" w="9525">
                     <a:solidFill>
                       <a:srgbClr val="000000"/>
                     </a:solidFill>
@@ -9327,7 +9336,7 @@
               </a:ln>
               <a:extLst>
                 <a:ext uri="{91240B29-F687-4f45-9708-019B960494DF}">
-                  <a14:hiddenLine xmlns:a14="http://schemas.microsoft.com/office/drawing/2010/main" xmlns="" w="9525">
+                  <a14:hiddenLine xmlns="" xmlns:a14="http://schemas.microsoft.com/office/drawing/2010/main" w="9525">
                     <a:solidFill>
                       <a:srgbClr val="000000"/>
                     </a:solidFill>
@@ -9389,7 +9398,7 @@
               </a:ln>
               <a:extLst>
                 <a:ext uri="{91240B29-F687-4f45-9708-019B960494DF}">
-                  <a14:hiddenLine xmlns:a14="http://schemas.microsoft.com/office/drawing/2010/main" xmlns="" w="9525">
+                  <a14:hiddenLine xmlns="" xmlns:a14="http://schemas.microsoft.com/office/drawing/2010/main" w="9525">
                     <a:solidFill>
                       <a:srgbClr val="000000"/>
                     </a:solidFill>
@@ -9479,7 +9488,7 @@
               </a:ln>
               <a:extLst>
                 <a:ext uri="{91240B29-F687-4f45-9708-019B960494DF}">
-                  <a14:hiddenLine xmlns:a14="http://schemas.microsoft.com/office/drawing/2010/main" xmlns="" w="9525">
+                  <a14:hiddenLine xmlns="" xmlns:a14="http://schemas.microsoft.com/office/drawing/2010/main" w="9525">
                     <a:solidFill>
                       <a:srgbClr val="000000"/>
                     </a:solidFill>
@@ -9541,7 +9550,7 @@
               </a:ln>
               <a:extLst>
                 <a:ext uri="{91240B29-F687-4f45-9708-019B960494DF}">
-                  <a14:hiddenLine xmlns:a14="http://schemas.microsoft.com/office/drawing/2010/main" xmlns="" w="9525">
+                  <a14:hiddenLine xmlns="" xmlns:a14="http://schemas.microsoft.com/office/drawing/2010/main" w="9525">
                     <a:solidFill>
                       <a:srgbClr val="000000"/>
                     </a:solidFill>
@@ -9603,7 +9612,7 @@
               </a:ln>
               <a:extLst>
                 <a:ext uri="{91240B29-F687-4f45-9708-019B960494DF}">
-                  <a14:hiddenLine xmlns:a14="http://schemas.microsoft.com/office/drawing/2010/main" xmlns="" w="9525">
+                  <a14:hiddenLine xmlns="" xmlns:a14="http://schemas.microsoft.com/office/drawing/2010/main" w="9525">
                     <a:solidFill>
                       <a:srgbClr val="000000"/>
                     </a:solidFill>
@@ -9693,7 +9702,7 @@
               </a:ln>
               <a:extLst>
                 <a:ext uri="{91240B29-F687-4f45-9708-019B960494DF}">
-                  <a14:hiddenLine xmlns:a14="http://schemas.microsoft.com/office/drawing/2010/main" xmlns="" w="9525">
+                  <a14:hiddenLine xmlns="" xmlns:a14="http://schemas.microsoft.com/office/drawing/2010/main" w="9525">
                     <a:solidFill>
                       <a:srgbClr val="000000"/>
                     </a:solidFill>
@@ -9783,7 +9792,7 @@
               </a:ln>
               <a:extLst>
                 <a:ext uri="{91240B29-F687-4f45-9708-019B960494DF}">
-                  <a14:hiddenLine xmlns:a14="http://schemas.microsoft.com/office/drawing/2010/main" xmlns="" w="9525">
+                  <a14:hiddenLine xmlns="" xmlns:a14="http://schemas.microsoft.com/office/drawing/2010/main" w="9525">
                     <a:solidFill>
                       <a:srgbClr val="000000"/>
                     </a:solidFill>
@@ -9845,7 +9854,7 @@
               </a:ln>
               <a:extLst>
                 <a:ext uri="{91240B29-F687-4f45-9708-019B960494DF}">
-                  <a14:hiddenLine xmlns:a14="http://schemas.microsoft.com/office/drawing/2010/main" xmlns="" w="9525">
+                  <a14:hiddenLine xmlns="" xmlns:a14="http://schemas.microsoft.com/office/drawing/2010/main" w="9525">
                     <a:solidFill>
                       <a:srgbClr val="000000"/>
                     </a:solidFill>
@@ -9955,7 +9964,7 @@
               </a:ln>
               <a:extLst>
                 <a:ext uri="{91240B29-F687-4f45-9708-019B960494DF}">
-                  <a14:hiddenLine xmlns:a14="http://schemas.microsoft.com/office/drawing/2010/main" xmlns="" w="9525">
+                  <a14:hiddenLine xmlns="" xmlns:a14="http://schemas.microsoft.com/office/drawing/2010/main" w="9525">
                     <a:solidFill>
                       <a:srgbClr val="000000"/>
                     </a:solidFill>
@@ -10039,7 +10048,7 @@
               </a:ln>
               <a:extLst>
                 <a:ext uri="{91240B29-F687-4f45-9708-019B960494DF}">
-                  <a14:hiddenLine xmlns:a14="http://schemas.microsoft.com/office/drawing/2010/main" xmlns="" w="9525">
+                  <a14:hiddenLine xmlns="" xmlns:a14="http://schemas.microsoft.com/office/drawing/2010/main" w="9525">
                     <a:solidFill>
                       <a:srgbClr val="000000"/>
                     </a:solidFill>
@@ -10101,7 +10110,7 @@
               </a:ln>
               <a:extLst>
                 <a:ext uri="{91240B29-F687-4f45-9708-019B960494DF}">
-                  <a14:hiddenLine xmlns:a14="http://schemas.microsoft.com/office/drawing/2010/main" xmlns="" w="9525">
+                  <a14:hiddenLine xmlns="" xmlns:a14="http://schemas.microsoft.com/office/drawing/2010/main" w="9525">
                     <a:solidFill>
                       <a:srgbClr val="000000"/>
                     </a:solidFill>
@@ -10163,7 +10172,7 @@
               </a:ln>
               <a:extLst>
                 <a:ext uri="{91240B29-F687-4f45-9708-019B960494DF}">
-                  <a14:hiddenLine xmlns:a14="http://schemas.microsoft.com/office/drawing/2010/main" xmlns="" w="9525">
+                  <a14:hiddenLine xmlns="" xmlns:a14="http://schemas.microsoft.com/office/drawing/2010/main" w="9525">
                     <a:solidFill>
                       <a:srgbClr val="000000"/>
                     </a:solidFill>
@@ -10253,7 +10262,7 @@
               </a:ln>
               <a:extLst>
                 <a:ext uri="{91240B29-F687-4f45-9708-019B960494DF}">
-                  <a14:hiddenLine xmlns:a14="http://schemas.microsoft.com/office/drawing/2010/main" xmlns="" w="9525">
+                  <a14:hiddenLine xmlns="" xmlns:a14="http://schemas.microsoft.com/office/drawing/2010/main" w="9525">
                     <a:solidFill>
                       <a:srgbClr val="000000"/>
                     </a:solidFill>
@@ -10287,7 +10296,7 @@
               </a:ln>
               <a:extLst>
                 <a:ext uri="{91240B29-F687-4f45-9708-019B960494DF}">
-                  <a14:hiddenLine xmlns:a14="http://schemas.microsoft.com/office/drawing/2010/main" xmlns="" w="9525">
+                  <a14:hiddenLine xmlns="" xmlns:a14="http://schemas.microsoft.com/office/drawing/2010/main" w="9525">
                     <a:solidFill>
                       <a:srgbClr val="000000"/>
                     </a:solidFill>
@@ -10352,7 +10361,7 @@
               </a:ln>
               <a:extLst>
                 <a:ext uri="{91240B29-F687-4f45-9708-019B960494DF}">
-                  <a14:hiddenLine xmlns:a14="http://schemas.microsoft.com/office/drawing/2010/main" xmlns="" w="9525">
+                  <a14:hiddenLine xmlns="" xmlns:a14="http://schemas.microsoft.com/office/drawing/2010/main" w="9525">
                     <a:solidFill>
                       <a:srgbClr val="000000"/>
                     </a:solidFill>
@@ -10442,7 +10451,7 @@
               </a:ln>
               <a:extLst>
                 <a:ext uri="{91240B29-F687-4f45-9708-019B960494DF}">
-                  <a14:hiddenLine xmlns:a14="http://schemas.microsoft.com/office/drawing/2010/main" xmlns="" w="9525">
+                  <a14:hiddenLine xmlns="" xmlns:a14="http://schemas.microsoft.com/office/drawing/2010/main" w="9525">
                     <a:solidFill>
                       <a:srgbClr val="000000"/>
                     </a:solidFill>
@@ -10504,7 +10513,7 @@
               </a:ln>
               <a:extLst>
                 <a:ext uri="{91240B29-F687-4f45-9708-019B960494DF}">
-                  <a14:hiddenLine xmlns:a14="http://schemas.microsoft.com/office/drawing/2010/main" xmlns="" w="9525">
+                  <a14:hiddenLine xmlns="" xmlns:a14="http://schemas.microsoft.com/office/drawing/2010/main" w="9525">
                     <a:solidFill>
                       <a:srgbClr val="000000"/>
                     </a:solidFill>
@@ -10594,7 +10603,7 @@
               </a:ln>
               <a:extLst>
                 <a:ext uri="{91240B29-F687-4f45-9708-019B960494DF}">
-                  <a14:hiddenLine xmlns:a14="http://schemas.microsoft.com/office/drawing/2010/main" xmlns="" w="9525">
+                  <a14:hiddenLine xmlns="" xmlns:a14="http://schemas.microsoft.com/office/drawing/2010/main" w="9525">
                     <a:solidFill>
                       <a:srgbClr val="000000"/>
                     </a:solidFill>
@@ -10659,7 +10668,7 @@
               </a:ln>
               <a:extLst>
                 <a:ext uri="{91240B29-F687-4f45-9708-019B960494DF}">
-                  <a14:hiddenLine xmlns:a14="http://schemas.microsoft.com/office/drawing/2010/main" xmlns="" w="9525">
+                  <a14:hiddenLine xmlns="" xmlns:a14="http://schemas.microsoft.com/office/drawing/2010/main" w="9525">
                     <a:solidFill>
                       <a:srgbClr val="000000"/>
                     </a:solidFill>
@@ -10721,7 +10730,7 @@
               </a:ln>
               <a:extLst>
                 <a:ext uri="{91240B29-F687-4f45-9708-019B960494DF}">
-                  <a14:hiddenLine xmlns:a14="http://schemas.microsoft.com/office/drawing/2010/main" xmlns="" w="9525">
+                  <a14:hiddenLine xmlns="" xmlns:a14="http://schemas.microsoft.com/office/drawing/2010/main" w="9525">
                     <a:solidFill>
                       <a:srgbClr val="000000"/>
                     </a:solidFill>
@@ -10811,7 +10820,7 @@
               </a:ln>
               <a:extLst>
                 <a:ext uri="{91240B29-F687-4f45-9708-019B960494DF}">
-                  <a14:hiddenLine xmlns:a14="http://schemas.microsoft.com/office/drawing/2010/main" xmlns="" w="9525">
+                  <a14:hiddenLine xmlns="" xmlns:a14="http://schemas.microsoft.com/office/drawing/2010/main" w="9525">
                     <a:solidFill>
                       <a:srgbClr val="000000"/>
                     </a:solidFill>
@@ -10901,7 +10910,7 @@
               </a:ln>
               <a:extLst>
                 <a:ext uri="{91240B29-F687-4f45-9708-019B960494DF}">
-                  <a14:hiddenLine xmlns:a14="http://schemas.microsoft.com/office/drawing/2010/main" xmlns="" w="9525">
+                  <a14:hiddenLine xmlns="" xmlns:a14="http://schemas.microsoft.com/office/drawing/2010/main" w="9525">
                     <a:solidFill>
                       <a:srgbClr val="000000"/>
                     </a:solidFill>
@@ -10966,7 +10975,7 @@
               </a:ln>
               <a:extLst>
                 <a:ext uri="{91240B29-F687-4f45-9708-019B960494DF}">
-                  <a14:hiddenLine xmlns:a14="http://schemas.microsoft.com/office/drawing/2010/main" xmlns="" w="9525">
+                  <a14:hiddenLine xmlns="" xmlns:a14="http://schemas.microsoft.com/office/drawing/2010/main" w="9525">
                     <a:solidFill>
                       <a:srgbClr val="000000"/>
                     </a:solidFill>
@@ -11086,7 +11095,7 @@
               </a:ln>
               <a:extLst>
                 <a:ext uri="{91240B29-F687-4f45-9708-019B960494DF}">
-                  <a14:hiddenLine xmlns:a14="http://schemas.microsoft.com/office/drawing/2010/main" xmlns="" w="9525">
+                  <a14:hiddenLine xmlns="" xmlns:a14="http://schemas.microsoft.com/office/drawing/2010/main" w="9525">
                     <a:solidFill>
                       <a:srgbClr val="000000"/>
                     </a:solidFill>
@@ -11167,7 +11176,7 @@
               </a:ln>
               <a:extLst>
                 <a:ext uri="{91240B29-F687-4f45-9708-019B960494DF}">
-                  <a14:hiddenLine xmlns:a14="http://schemas.microsoft.com/office/drawing/2010/main" xmlns="" w="9525">
+                  <a14:hiddenLine xmlns="" xmlns:a14="http://schemas.microsoft.com/office/drawing/2010/main" w="9525">
                     <a:solidFill>
                       <a:srgbClr val="000000"/>
                     </a:solidFill>
@@ -11282,7 +11291,7 @@
               </a:ln>
               <a:extLst>
                 <a:ext uri="{91240B29-F687-4f45-9708-019B960494DF}">
-                  <a14:hiddenLine xmlns:a14="http://schemas.microsoft.com/office/drawing/2010/main" xmlns="" w="9525">
+                  <a14:hiddenLine xmlns="" xmlns:a14="http://schemas.microsoft.com/office/drawing/2010/main" w="9525">
                     <a:solidFill>
                       <a:srgbClr val="000000"/>
                     </a:solidFill>
@@ -11372,7 +11381,7 @@
               </a:ln>
               <a:extLst>
                 <a:ext uri="{91240B29-F687-4f45-9708-019B960494DF}">
-                  <a14:hiddenLine xmlns:a14="http://schemas.microsoft.com/office/drawing/2010/main" xmlns="" w="9525">
+                  <a14:hiddenLine xmlns="" xmlns:a14="http://schemas.microsoft.com/office/drawing/2010/main" w="9525">
                     <a:solidFill>
                       <a:srgbClr val="000000"/>
                     </a:solidFill>
@@ -11437,7 +11446,7 @@
               </a:ln>
               <a:extLst>
                 <a:ext uri="{91240B29-F687-4f45-9708-019B960494DF}">
-                  <a14:hiddenLine xmlns:a14="http://schemas.microsoft.com/office/drawing/2010/main" xmlns="" w="9525">
+                  <a14:hiddenLine xmlns="" xmlns:a14="http://schemas.microsoft.com/office/drawing/2010/main" w="9525">
                     <a:solidFill>
                       <a:srgbClr val="000000"/>
                     </a:solidFill>
@@ -11527,7 +11536,7 @@
               </a:ln>
               <a:extLst>
                 <a:ext uri="{91240B29-F687-4f45-9708-019B960494DF}">
-                  <a14:hiddenLine xmlns:a14="http://schemas.microsoft.com/office/drawing/2010/main" xmlns="" w="9525">
+                  <a14:hiddenLine xmlns="" xmlns:a14="http://schemas.microsoft.com/office/drawing/2010/main" w="9525">
                     <a:solidFill>
                       <a:srgbClr val="000000"/>
                     </a:solidFill>
@@ -11595,7 +11604,7 @@
               </a:ln>
               <a:extLst>
                 <a:ext uri="{91240B29-F687-4f45-9708-019B960494DF}">
-                  <a14:hiddenLine xmlns:a14="http://schemas.microsoft.com/office/drawing/2010/main" xmlns="" w="9525">
+                  <a14:hiddenLine xmlns="" xmlns:a14="http://schemas.microsoft.com/office/drawing/2010/main" w="9525">
                     <a:solidFill>
                       <a:srgbClr val="000000"/>
                     </a:solidFill>
@@ -11685,7 +11694,7 @@
               </a:ln>
               <a:extLst>
                 <a:ext uri="{91240B29-F687-4f45-9708-019B960494DF}">
-                  <a14:hiddenLine xmlns:a14="http://schemas.microsoft.com/office/drawing/2010/main" xmlns="" w="9525">
+                  <a14:hiddenLine xmlns="" xmlns:a14="http://schemas.microsoft.com/office/drawing/2010/main" w="9525">
                     <a:solidFill>
                       <a:srgbClr val="000000"/>
                     </a:solidFill>
@@ -11753,7 +11762,7 @@
               </a:ln>
               <a:extLst>
                 <a:ext uri="{91240B29-F687-4f45-9708-019B960494DF}">
-                  <a14:hiddenLine xmlns:a14="http://schemas.microsoft.com/office/drawing/2010/main" xmlns="" w="9525">
+                  <a14:hiddenLine xmlns="" xmlns:a14="http://schemas.microsoft.com/office/drawing/2010/main" w="9525">
                     <a:solidFill>
                       <a:srgbClr val="000000"/>
                     </a:solidFill>
@@ -11843,7 +11852,7 @@
               </a:ln>
               <a:extLst>
                 <a:ext uri="{91240B29-F687-4f45-9708-019B960494DF}">
-                  <a14:hiddenLine xmlns:a14="http://schemas.microsoft.com/office/drawing/2010/main" xmlns="" w="9525">
+                  <a14:hiddenLine xmlns="" xmlns:a14="http://schemas.microsoft.com/office/drawing/2010/main" w="9525">
                     <a:solidFill>
                       <a:srgbClr val="000000"/>
                     </a:solidFill>
@@ -11877,7 +11886,7 @@
               </a:ln>
               <a:extLst>
                 <a:ext uri="{91240B29-F687-4f45-9708-019B960494DF}">
-                  <a14:hiddenLine xmlns:a14="http://schemas.microsoft.com/office/drawing/2010/main" xmlns="" w="9525">
+                  <a14:hiddenLine xmlns="" xmlns:a14="http://schemas.microsoft.com/office/drawing/2010/main" w="9525">
                     <a:solidFill>
                       <a:srgbClr val="000000"/>
                     </a:solidFill>
@@ -12018,7 +12027,7 @@
             <a:fld id="{48A87A34-81AB-432B-8DAE-1953F412C126}" type="datetimeFigureOut">
               <a:rPr lang="en-US" smtClean="0"/>
               <a:pPr/>
-              <a:t>10/26/2018</a:t>
+              <a:t>10/30/2018</a:t>
             </a:fld>
             <a:endParaRPr lang="en-US" dirty="0"/>
           </a:p>
@@ -12529,7 +12538,15 @@
                   <a:schemeClr val="tx1"/>
                 </a:solidFill>
               </a:rPr>
-              <a:t>Geovani Richard</a:t>
+              <a:t>Giovane </a:t>
+            </a:r>
+            <a:r>
+              <a:rPr lang="pt-BR" dirty="0" smtClean="0">
+                <a:solidFill>
+                  <a:schemeClr val="tx1"/>
+                </a:solidFill>
+              </a:rPr>
+              <a:t>Richard</a:t>
             </a:r>
           </a:p>
           <a:p>
@@ -12631,19 +12648,22 @@
         </p:nvSpPr>
         <p:spPr>
           <a:xfrm>
-            <a:off x="1141413" y="195943"/>
-            <a:ext cx="9905998" cy="744583"/>
+            <a:off x="2597383" y="134470"/>
+            <a:ext cx="7116840" cy="1250576"/>
           </a:xfrm>
         </p:spPr>
         <p:txBody>
-          <a:bodyPr>
-            <a:normAutofit/>
-          </a:bodyPr>
+          <a:bodyPr/>
           <a:lstStyle/>
           <a:p>
+            <a:pPr algn="ctr"/>
             <a:r>
               <a:rPr lang="pt-BR" dirty="0" smtClean="0"/>
-              <a:t>gráfico</a:t>
+              <a:t>Instituições </a:t>
+            </a:r>
+            <a:r>
+              <a:rPr lang="pt-BR" dirty="0" smtClean="0"/>
+              <a:t>federais e Privadas lucrativas</a:t>
             </a:r>
             <a:endParaRPr lang="pt-BR" dirty="0"/>
           </a:p>
@@ -12651,7 +12671,7 @@
       </p:sp>
       <p:pic>
         <p:nvPicPr>
-          <p:cNvPr id="4" name="Imagem 3"/>
+          <p:cNvPr id="3" name="Imagem 2"/>
           <p:cNvPicPr>
             <a:picLocks noChangeAspect="1"/>
           </p:cNvPicPr>
@@ -12671,8 +12691,8 @@
         </p:blipFill>
         <p:spPr>
           <a:xfrm>
-            <a:off x="312609" y="1188720"/>
-            <a:ext cx="11563605" cy="5375468"/>
+            <a:off x="2569608" y="1586336"/>
+            <a:ext cx="7172390" cy="4781593"/>
           </a:xfrm>
           <a:prstGeom prst="rect">
             <a:avLst/>
@@ -12682,7 +12702,7 @@
     </p:spTree>
     <p:extLst>
       <p:ext uri="{BB962C8B-B14F-4D97-AF65-F5344CB8AC3E}">
-        <p14:creationId xmlns:p14="http://schemas.microsoft.com/office/powerpoint/2010/main" val="1477976766"/>
+        <p14:creationId xmlns:p14="http://schemas.microsoft.com/office/powerpoint/2010/main" val="347900934"/>
       </p:ext>
     </p:extLst>
   </p:cSld>
@@ -12716,66 +12736,6 @@
           <a:chExt cx="0" cy="0"/>
         </a:xfrm>
       </p:grpSpPr>
-      <p:pic>
-        <p:nvPicPr>
-          <p:cNvPr id="6" name="Imagem 5"/>
-          <p:cNvPicPr>
-            <a:picLocks noChangeAspect="1"/>
-          </p:cNvPicPr>
-          <p:nvPr/>
-        </p:nvPicPr>
-        <p:blipFill>
-          <a:blip r:embed="rId2">
-            <a:extLst>
-              <a:ext uri="{28A0092B-C50C-407E-A947-70E740481C1C}">
-                <a14:useLocalDpi xmlns:a14="http://schemas.microsoft.com/office/drawing/2010/main" val="0"/>
-              </a:ext>
-            </a:extLst>
-          </a:blip>
-          <a:stretch>
-            <a:fillRect/>
-          </a:stretch>
-        </p:blipFill>
-        <p:spPr>
-          <a:xfrm>
-            <a:off x="1288878" y="1659987"/>
-            <a:ext cx="9699483" cy="3327926"/>
-          </a:xfrm>
-          <a:prstGeom prst="rect">
-            <a:avLst/>
-          </a:prstGeom>
-        </p:spPr>
-      </p:pic>
-    </p:spTree>
-    <p:extLst>
-      <p:ext uri="{BB962C8B-B14F-4D97-AF65-F5344CB8AC3E}">
-        <p14:creationId xmlns:p14="http://schemas.microsoft.com/office/powerpoint/2010/main" val="4269556997"/>
-      </p:ext>
-    </p:extLst>
-  </p:cSld>
-  <p:clrMapOvr>
-    <a:masterClrMapping/>
-  </p:clrMapOvr>
-</p:sld>
-</file>
-
-<file path=ppt/slides/slide2.xml><?xml version="1.0" encoding="utf-8"?>
-<p:sld xmlns:a="http://schemas.openxmlformats.org/drawingml/2006/main" xmlns:r="http://schemas.openxmlformats.org/officeDocument/2006/relationships" xmlns:p="http://schemas.openxmlformats.org/presentationml/2006/main">
-  <p:cSld>
-    <p:spTree>
-      <p:nvGrpSpPr>
-        <p:cNvPr id="1" name=""/>
-        <p:cNvGrpSpPr/>
-        <p:nvPr/>
-      </p:nvGrpSpPr>
-      <p:grpSpPr>
-        <a:xfrm>
-          <a:off x="0" y="0"/>
-          <a:ext cx="0" cy="0"/>
-          <a:chOff x="0" y="0"/>
-          <a:chExt cx="0" cy="0"/>
-        </a:xfrm>
-      </p:grpSpPr>
       <p:sp>
         <p:nvSpPr>
           <p:cNvPr id="2" name="Título 1"/>
@@ -12788,377 +12748,22 @@
         </p:nvSpPr>
         <p:spPr>
           <a:xfrm>
-            <a:off x="1141412" y="0"/>
-            <a:ext cx="9905998" cy="1478570"/>
+            <a:off x="2597383" y="134470"/>
+            <a:ext cx="7116840" cy="1250576"/>
           </a:xfrm>
         </p:spPr>
         <p:txBody>
           <a:bodyPr/>
           <a:lstStyle/>
           <a:p>
-            <a:r>
-              <a:rPr lang="pt-BR" dirty="0" err="1" smtClean="0"/>
-              <a:t>enade</a:t>
-            </a:r>
-            <a:endParaRPr lang="pt-BR" dirty="0"/>
-          </a:p>
-        </p:txBody>
-      </p:sp>
-      <p:sp>
-        <p:nvSpPr>
-          <p:cNvPr id="3" name="Espaço Reservado para Conteúdo 2"/>
-          <p:cNvSpPr>
-            <a:spLocks noGrp="1"/>
-          </p:cNvSpPr>
-          <p:nvPr>
-            <p:ph idx="1"/>
-          </p:nvPr>
-        </p:nvSpPr>
-        <p:spPr>
-          <a:xfrm>
-            <a:off x="1141412" y="1293223"/>
-            <a:ext cx="9905999" cy="4497978"/>
-          </a:xfrm>
-        </p:spPr>
-        <p:txBody>
-          <a:bodyPr/>
-          <a:lstStyle/>
-          <a:p>
-            <a:r>
-              <a:rPr lang="pt-BR" dirty="0"/>
-              <a:t>O Exame Nacional de Desempenho de Estudantes (</a:t>
-            </a:r>
-            <a:r>
-              <a:rPr lang="pt-BR" dirty="0" err="1"/>
-              <a:t>Enade</a:t>
-            </a:r>
-            <a:r>
-              <a:rPr lang="pt-BR" dirty="0"/>
-              <a:t>) avalia o rendimento dos concluintes dos cursos de graduação, em relação aos conteúdos programáticos, habilidades e competências adquiridas em sua formação. </a:t>
-            </a:r>
-            <a:endParaRPr lang="pt-BR" dirty="0" smtClean="0"/>
-          </a:p>
-          <a:p>
-            <a:r>
-              <a:rPr lang="pt-BR" dirty="0"/>
-              <a:t>O objetivo do </a:t>
-            </a:r>
-            <a:r>
-              <a:rPr lang="pt-BR" dirty="0" err="1"/>
-              <a:t>Enade</a:t>
-            </a:r>
-            <a:r>
-              <a:rPr lang="pt-BR" dirty="0"/>
-              <a:t> é avaliar o desempenho dos estudantes com relação aos conteúdos programáticos previstos nas diretrizes curriculares dos cursos de graduação, o desenvolvimento de competências e habilidades necessárias ao aprofundamento da formação geral e profissional, e o nível de atualização dos estudantes com relação à realidade brasileira e </a:t>
-            </a:r>
+            <a:pPr algn="ctr"/>
             <a:r>
               <a:rPr lang="pt-BR" dirty="0" smtClean="0"/>
-              <a:t>mundial.</a:t>
-            </a:r>
-            <a:endParaRPr lang="pt-BR" dirty="0"/>
-          </a:p>
-        </p:txBody>
-      </p:sp>
-    </p:spTree>
-    <p:extLst>
-      <p:ext uri="{BB962C8B-B14F-4D97-AF65-F5344CB8AC3E}">
-        <p14:creationId xmlns:p14="http://schemas.microsoft.com/office/powerpoint/2010/main" val="3084386775"/>
-      </p:ext>
-    </p:extLst>
-  </p:cSld>
-  <p:clrMapOvr>
-    <a:masterClrMapping/>
-  </p:clrMapOvr>
-  <p:timing>
-    <p:tnLst>
-      <p:par>
-        <p:cTn id="1" dur="indefinite" restart="never" nodeType="tmRoot"/>
-      </p:par>
-    </p:tnLst>
-  </p:timing>
-</p:sld>
-</file>
-
-<file path=ppt/slides/slide3.xml><?xml version="1.0" encoding="utf-8"?>
-<p:sld xmlns:a="http://schemas.openxmlformats.org/drawingml/2006/main" xmlns:r="http://schemas.openxmlformats.org/officeDocument/2006/relationships" xmlns:p="http://schemas.openxmlformats.org/presentationml/2006/main">
-  <p:cSld>
-    <p:spTree>
-      <p:nvGrpSpPr>
-        <p:cNvPr id="1" name=""/>
-        <p:cNvGrpSpPr/>
-        <p:nvPr/>
-      </p:nvGrpSpPr>
-      <p:grpSpPr>
-        <a:xfrm>
-          <a:off x="0" y="0"/>
-          <a:ext cx="0" cy="0"/>
-          <a:chOff x="0" y="0"/>
-          <a:chExt cx="0" cy="0"/>
-        </a:xfrm>
-      </p:grpSpPr>
-      <p:sp>
-        <p:nvSpPr>
-          <p:cNvPr id="2" name="Título 1"/>
-          <p:cNvSpPr>
-            <a:spLocks noGrp="1"/>
-          </p:cNvSpPr>
-          <p:nvPr>
-            <p:ph type="title"/>
-          </p:nvPr>
-        </p:nvSpPr>
-        <p:spPr>
-          <a:xfrm>
-            <a:off x="1232853" y="-152190"/>
-            <a:ext cx="9905998" cy="909836"/>
-          </a:xfrm>
-        </p:spPr>
-        <p:txBody>
-          <a:bodyPr>
-            <a:normAutofit fontScale="90000"/>
-          </a:bodyPr>
-          <a:lstStyle/>
-          <a:p>
+              <a:t>Instituições </a:t>
+            </a:r>
             <a:r>
               <a:rPr lang="pt-BR" dirty="0" smtClean="0"/>
-              <a:t/>
-            </a:r>
-            <a:br>
-              <a:rPr lang="pt-BR" dirty="0" smtClean="0"/>
-            </a:br>
-            <a:r>
-              <a:rPr lang="pt-BR" dirty="0"/>
-              <a:t/>
-            </a:r>
-            <a:br>
-              <a:rPr lang="pt-BR" dirty="0"/>
-            </a:br>
-            <a:r>
-              <a:rPr lang="pt-BR" dirty="0" smtClean="0"/>
-              <a:t>Instituições Federais</a:t>
-            </a:r>
-            <a:endParaRPr lang="pt-BR" dirty="0"/>
-          </a:p>
-        </p:txBody>
-      </p:sp>
-      <p:pic>
-        <p:nvPicPr>
-          <p:cNvPr id="5" name="Imagem 4"/>
-          <p:cNvPicPr>
-            <a:picLocks noChangeAspect="1"/>
-          </p:cNvPicPr>
-          <p:nvPr/>
-        </p:nvPicPr>
-        <p:blipFill>
-          <a:blip r:embed="rId2">
-            <a:extLst>
-              <a:ext uri="{28A0092B-C50C-407E-A947-70E740481C1C}">
-                <a14:useLocalDpi xmlns:a14="http://schemas.microsoft.com/office/drawing/2010/main" val="0"/>
-              </a:ext>
-            </a:extLst>
-          </a:blip>
-          <a:stretch>
-            <a:fillRect/>
-          </a:stretch>
-        </p:blipFill>
-        <p:spPr>
-          <a:xfrm>
-            <a:off x="308342" y="1240973"/>
-            <a:ext cx="11479300" cy="5336278"/>
-          </a:xfrm>
-          <a:prstGeom prst="rect">
-            <a:avLst/>
-          </a:prstGeom>
-        </p:spPr>
-      </p:pic>
-      <p:sp>
-        <p:nvSpPr>
-          <p:cNvPr id="6" name="CaixaDeTexto 5"/>
-          <p:cNvSpPr txBox="1"/>
-          <p:nvPr/>
-        </p:nvSpPr>
-        <p:spPr>
-          <a:xfrm>
-            <a:off x="9366070" y="1828799"/>
-            <a:ext cx="2325188" cy="2062103"/>
-          </a:xfrm>
-          <a:prstGeom prst="rect">
-            <a:avLst/>
-          </a:prstGeom>
-        </p:spPr>
-        <p:style>
-          <a:lnRef idx="2">
-            <a:schemeClr val="accent1"/>
-          </a:lnRef>
-          <a:fillRef idx="1">
-            <a:schemeClr val="lt1"/>
-          </a:fillRef>
-          <a:effectRef idx="0">
-            <a:schemeClr val="accent1"/>
-          </a:effectRef>
-          <a:fontRef idx="minor">
-            <a:schemeClr val="dk1"/>
-          </a:fontRef>
-        </p:style>
-        <p:txBody>
-          <a:bodyPr wrap="square" rtlCol="0">
-            <a:spAutoFit/>
-          </a:bodyPr>
-          <a:lstStyle/>
-          <a:p>
-            <a:r>
-              <a:rPr lang="en-US" sz="1600" dirty="0">
-                <a:solidFill>
-                  <a:schemeClr val="bg1"/>
-                </a:solidFill>
-              </a:rPr>
-              <a:t>count    2706.000000</a:t>
-            </a:r>
-          </a:p>
-          <a:p>
-            <a:r>
-              <a:rPr lang="en-US" sz="1600" dirty="0">
-                <a:solidFill>
-                  <a:schemeClr val="bg1"/>
-                </a:solidFill>
-              </a:rPr>
-              <a:t>mean       50.699815</a:t>
-            </a:r>
-          </a:p>
-          <a:p>
-            <a:r>
-              <a:rPr lang="en-US" sz="1600" dirty="0" err="1">
-                <a:solidFill>
-                  <a:schemeClr val="bg1"/>
-                </a:solidFill>
-              </a:rPr>
-              <a:t>std</a:t>
-            </a:r>
-            <a:r>
-              <a:rPr lang="en-US" sz="1600" dirty="0">
-                <a:solidFill>
-                  <a:schemeClr val="bg1"/>
-                </a:solidFill>
-              </a:rPr>
-              <a:t>        13.312321</a:t>
-            </a:r>
-          </a:p>
-          <a:p>
-            <a:r>
-              <a:rPr lang="en-US" sz="1600" dirty="0">
-                <a:solidFill>
-                  <a:schemeClr val="bg1"/>
-                </a:solidFill>
-              </a:rPr>
-              <a:t>min         0.000000</a:t>
-            </a:r>
-          </a:p>
-          <a:p>
-            <a:r>
-              <a:rPr lang="en-US" sz="1600" dirty="0">
-                <a:solidFill>
-                  <a:schemeClr val="bg1"/>
-                </a:solidFill>
-              </a:rPr>
-              <a:t>25%        41.525000</a:t>
-            </a:r>
-          </a:p>
-          <a:p>
-            <a:r>
-              <a:rPr lang="en-US" sz="1600" dirty="0">
-                <a:solidFill>
-                  <a:schemeClr val="bg1"/>
-                </a:solidFill>
-              </a:rPr>
-              <a:t>50%        51.100000</a:t>
-            </a:r>
-          </a:p>
-          <a:p>
-            <a:r>
-              <a:rPr lang="en-US" sz="1600" dirty="0">
-                <a:solidFill>
-                  <a:schemeClr val="bg1"/>
-                </a:solidFill>
-              </a:rPr>
-              <a:t>75%        60.175000</a:t>
-            </a:r>
-          </a:p>
-          <a:p>
-            <a:r>
-              <a:rPr lang="en-US" sz="1600" dirty="0">
-                <a:solidFill>
-                  <a:schemeClr val="bg1"/>
-                </a:solidFill>
-              </a:rPr>
-              <a:t>max        95.100000</a:t>
-            </a:r>
-            <a:endParaRPr lang="pt-BR" sz="1600" dirty="0">
-              <a:solidFill>
-                <a:schemeClr val="bg1"/>
-              </a:solidFill>
-            </a:endParaRPr>
-          </a:p>
-        </p:txBody>
-      </p:sp>
-    </p:spTree>
-    <p:extLst>
-      <p:ext uri="{BB962C8B-B14F-4D97-AF65-F5344CB8AC3E}">
-        <p14:creationId xmlns:p14="http://schemas.microsoft.com/office/powerpoint/2010/main" val="4273523214"/>
-      </p:ext>
-    </p:extLst>
-  </p:cSld>
-  <p:clrMapOvr>
-    <a:masterClrMapping/>
-  </p:clrMapOvr>
-  <p:timing>
-    <p:tnLst>
-      <p:par>
-        <p:cTn id="1" dur="indefinite" restart="never" nodeType="tmRoot"/>
-      </p:par>
-    </p:tnLst>
-  </p:timing>
-</p:sld>
-</file>
-
-<file path=ppt/slides/slide4.xml><?xml version="1.0" encoding="utf-8"?>
-<p:sld xmlns:a="http://schemas.openxmlformats.org/drawingml/2006/main" xmlns:r="http://schemas.openxmlformats.org/officeDocument/2006/relationships" xmlns:p="http://schemas.openxmlformats.org/presentationml/2006/main">
-  <p:cSld>
-    <p:spTree>
-      <p:nvGrpSpPr>
-        <p:cNvPr id="1" name=""/>
-        <p:cNvGrpSpPr/>
-        <p:nvPr/>
-      </p:nvGrpSpPr>
-      <p:grpSpPr>
-        <a:xfrm>
-          <a:off x="0" y="0"/>
-          <a:ext cx="0" cy="0"/>
-          <a:chOff x="0" y="0"/>
-          <a:chExt cx="0" cy="0"/>
-        </a:xfrm>
-      </p:grpSpPr>
-      <p:sp>
-        <p:nvSpPr>
-          <p:cNvPr id="2" name="Título 1"/>
-          <p:cNvSpPr>
-            <a:spLocks noGrp="1"/>
-          </p:cNvSpPr>
-          <p:nvPr>
-            <p:ph type="title"/>
-          </p:nvPr>
-        </p:nvSpPr>
-        <p:spPr>
-          <a:xfrm>
-            <a:off x="1141412" y="0"/>
-            <a:ext cx="9905998" cy="1478570"/>
-          </a:xfrm>
-        </p:spPr>
-        <p:txBody>
-          <a:bodyPr/>
-          <a:lstStyle/>
-          <a:p>
-            <a:r>
-              <a:rPr lang="pt-BR" dirty="0" smtClean="0"/>
-              <a:t>Instituições não federais</a:t>
+              <a:t>federais e Privadas não lucrativas</a:t>
             </a:r>
             <a:endParaRPr lang="pt-BR" dirty="0"/>
           </a:p>
@@ -13186,110 +12791,18 @@
         </p:blipFill>
         <p:spPr>
           <a:xfrm>
-            <a:off x="134484" y="1123406"/>
-            <a:ext cx="11928912" cy="5545285"/>
+            <a:off x="2555040" y="1640125"/>
+            <a:ext cx="7201526" cy="4801017"/>
           </a:xfrm>
           <a:prstGeom prst="rect">
             <a:avLst/>
           </a:prstGeom>
         </p:spPr>
       </p:pic>
-      <p:sp>
-        <p:nvSpPr>
-          <p:cNvPr id="5" name="CaixaDeTexto 4"/>
-          <p:cNvSpPr txBox="1"/>
-          <p:nvPr/>
-        </p:nvSpPr>
-        <p:spPr>
-          <a:xfrm>
-            <a:off x="9888583" y="1737360"/>
-            <a:ext cx="2024743" cy="2062103"/>
-          </a:xfrm>
-          <a:prstGeom prst="rect">
-            <a:avLst/>
-          </a:prstGeom>
-          <a:solidFill>
-            <a:schemeClr val="tx1"/>
-          </a:solidFill>
-        </p:spPr>
-        <p:style>
-          <a:lnRef idx="2">
-            <a:schemeClr val="accent2"/>
-          </a:lnRef>
-          <a:fillRef idx="1">
-            <a:schemeClr val="lt1"/>
-          </a:fillRef>
-          <a:effectRef idx="0">
-            <a:schemeClr val="accent2"/>
-          </a:effectRef>
-          <a:fontRef idx="minor">
-            <a:schemeClr val="dk1"/>
-          </a:fontRef>
-        </p:style>
-        <p:txBody>
-          <a:bodyPr wrap="square" rtlCol="0">
-            <a:spAutoFit/>
-          </a:bodyPr>
-          <a:lstStyle/>
-          <a:p>
-            <a:r>
-              <a:rPr lang="en-US" sz="1600" dirty="0"/>
-              <a:t>count    5783.000000</a:t>
-            </a:r>
-          </a:p>
-          <a:p>
-            <a:r>
-              <a:rPr lang="en-US" sz="1600" dirty="0"/>
-              <a:t>mean       39.782812</a:t>
-            </a:r>
-          </a:p>
-          <a:p>
-            <a:r>
-              <a:rPr lang="en-US" sz="1600" dirty="0" err="1"/>
-              <a:t>std</a:t>
-            </a:r>
-            <a:r>
-              <a:rPr lang="en-US" sz="1600" dirty="0"/>
-              <a:t>        12.326573</a:t>
-            </a:r>
-          </a:p>
-          <a:p>
-            <a:r>
-              <a:rPr lang="en-US" sz="1600" dirty="0"/>
-              <a:t>min         0.000000</a:t>
-            </a:r>
-          </a:p>
-          <a:p>
-            <a:r>
-              <a:rPr lang="en-US" sz="1600" dirty="0"/>
-              <a:t>25%        31.400000</a:t>
-            </a:r>
-          </a:p>
-          <a:p>
-            <a:r>
-              <a:rPr lang="en-US" sz="1600" dirty="0"/>
-              <a:t>50%        38.900000</a:t>
-            </a:r>
-          </a:p>
-          <a:p>
-            <a:r>
-              <a:rPr lang="en-US" sz="1600" dirty="0"/>
-              <a:t>75%        47.400000</a:t>
-            </a:r>
-          </a:p>
-          <a:p>
-            <a:r>
-              <a:rPr lang="en-US" sz="1600" dirty="0"/>
-              <a:t>max        93.300000</a:t>
-            </a:r>
-            <a:endParaRPr lang="pt-BR" sz="1600" dirty="0"/>
-          </a:p>
-        </p:txBody>
-      </p:sp>
     </p:spTree>
     <p:extLst>
       <p:ext uri="{BB962C8B-B14F-4D97-AF65-F5344CB8AC3E}">
-        <p14:creationId xmlns:p14="http://schemas.microsoft.com/office/powerpoint/2010/main" val="3643187902"/>
+        <p14:creationId xmlns:p14="http://schemas.microsoft.com/office/powerpoint/2010/main" val="1368809437"/>
       </p:ext>
     </p:extLst>
   </p:cSld>
@@ -13306,568 +12819,7 @@
 </p:sld>
 </file>
 
-<file path=ppt/slides/slide5.xml><?xml version="1.0" encoding="utf-8"?>
-<p:sld xmlns:a="http://schemas.openxmlformats.org/drawingml/2006/main" xmlns:r="http://schemas.openxmlformats.org/officeDocument/2006/relationships" xmlns:p="http://schemas.openxmlformats.org/presentationml/2006/main">
-  <p:cSld>
-    <p:spTree>
-      <p:nvGrpSpPr>
-        <p:cNvPr id="1" name=""/>
-        <p:cNvGrpSpPr/>
-        <p:nvPr/>
-      </p:nvGrpSpPr>
-      <p:grpSpPr>
-        <a:xfrm>
-          <a:off x="0" y="0"/>
-          <a:ext cx="0" cy="0"/>
-          <a:chOff x="0" y="0"/>
-          <a:chExt cx="0" cy="0"/>
-        </a:xfrm>
-      </p:grpSpPr>
-      <p:sp>
-        <p:nvSpPr>
-          <p:cNvPr id="2" name="Título 1"/>
-          <p:cNvSpPr>
-            <a:spLocks noGrp="1"/>
-          </p:cNvSpPr>
-          <p:nvPr>
-            <p:ph type="title"/>
-          </p:nvPr>
-        </p:nvSpPr>
-        <p:spPr>
-          <a:xfrm>
-            <a:off x="1141412" y="-113002"/>
-            <a:ext cx="9905998" cy="1478570"/>
-          </a:xfrm>
-        </p:spPr>
-        <p:txBody>
-          <a:bodyPr/>
-          <a:lstStyle/>
-          <a:p>
-            <a:r>
-              <a:rPr lang="pt-BR" dirty="0" smtClean="0"/>
-              <a:t>Instituições estaduais</a:t>
-            </a:r>
-            <a:endParaRPr lang="pt-BR" dirty="0"/>
-          </a:p>
-        </p:txBody>
-      </p:sp>
-      <p:pic>
-        <p:nvPicPr>
-          <p:cNvPr id="4" name="Imagem 3"/>
-          <p:cNvPicPr>
-            <a:picLocks noChangeAspect="1"/>
-          </p:cNvPicPr>
-          <p:nvPr/>
-        </p:nvPicPr>
-        <p:blipFill>
-          <a:blip r:embed="rId2">
-            <a:extLst>
-              <a:ext uri="{28A0092B-C50C-407E-A947-70E740481C1C}">
-                <a14:useLocalDpi xmlns:a14="http://schemas.microsoft.com/office/drawing/2010/main" val="0"/>
-              </a:ext>
-            </a:extLst>
-          </a:blip>
-          <a:stretch>
-            <a:fillRect/>
-          </a:stretch>
-        </p:blipFill>
-        <p:spPr>
-          <a:xfrm>
-            <a:off x="107907" y="1175658"/>
-            <a:ext cx="11928910" cy="5545284"/>
-          </a:xfrm>
-          <a:prstGeom prst="rect">
-            <a:avLst/>
-          </a:prstGeom>
-        </p:spPr>
-      </p:pic>
-      <p:sp>
-        <p:nvSpPr>
-          <p:cNvPr id="5" name="CaixaDeTexto 4"/>
-          <p:cNvSpPr txBox="1"/>
-          <p:nvPr/>
-        </p:nvSpPr>
-        <p:spPr>
-          <a:xfrm>
-            <a:off x="9836331" y="1698171"/>
-            <a:ext cx="2103120" cy="2062103"/>
-          </a:xfrm>
-          <a:prstGeom prst="rect">
-            <a:avLst/>
-          </a:prstGeom>
-          <a:solidFill>
-            <a:schemeClr val="tx1"/>
-          </a:solidFill>
-        </p:spPr>
-        <p:style>
-          <a:lnRef idx="2">
-            <a:schemeClr val="accent4"/>
-          </a:lnRef>
-          <a:fillRef idx="1">
-            <a:schemeClr val="lt1"/>
-          </a:fillRef>
-          <a:effectRef idx="0">
-            <a:schemeClr val="accent4"/>
-          </a:effectRef>
-          <a:fontRef idx="minor">
-            <a:schemeClr val="dk1"/>
-          </a:fontRef>
-        </p:style>
-        <p:txBody>
-          <a:bodyPr wrap="square" rtlCol="0">
-            <a:spAutoFit/>
-          </a:bodyPr>
-          <a:lstStyle/>
-          <a:p>
-            <a:r>
-              <a:rPr lang="en-US" sz="1600" dirty="0"/>
-              <a:t>count    970.000000</a:t>
-            </a:r>
-          </a:p>
-          <a:p>
-            <a:r>
-              <a:rPr lang="en-US" sz="1600" dirty="0"/>
-              <a:t>mean      45.210206</a:t>
-            </a:r>
-          </a:p>
-          <a:p>
-            <a:r>
-              <a:rPr lang="en-US" sz="1600" dirty="0" err="1"/>
-              <a:t>std</a:t>
-            </a:r>
-            <a:r>
-              <a:rPr lang="en-US" sz="1600" dirty="0"/>
-              <a:t>       13.429972</a:t>
-            </a:r>
-          </a:p>
-          <a:p>
-            <a:r>
-              <a:rPr lang="en-US" sz="1600" dirty="0"/>
-              <a:t>min        0.000000</a:t>
-            </a:r>
-          </a:p>
-          <a:p>
-            <a:r>
-              <a:rPr lang="en-US" sz="1600" dirty="0"/>
-              <a:t>25%       35.900000</a:t>
-            </a:r>
-          </a:p>
-          <a:p>
-            <a:r>
-              <a:rPr lang="en-US" sz="1600" dirty="0"/>
-              <a:t>50%       44.800000</a:t>
-            </a:r>
-          </a:p>
-          <a:p>
-            <a:r>
-              <a:rPr lang="en-US" sz="1600" dirty="0"/>
-              <a:t>75%       54.500000</a:t>
-            </a:r>
-          </a:p>
-          <a:p>
-            <a:r>
-              <a:rPr lang="en-US" sz="1600" dirty="0"/>
-              <a:t>max       86.500000</a:t>
-            </a:r>
-            <a:endParaRPr lang="pt-BR" sz="1600" dirty="0"/>
-          </a:p>
-        </p:txBody>
-      </p:sp>
-    </p:spTree>
-    <p:extLst>
-      <p:ext uri="{BB962C8B-B14F-4D97-AF65-F5344CB8AC3E}">
-        <p14:creationId xmlns:p14="http://schemas.microsoft.com/office/powerpoint/2010/main" val="397607257"/>
-      </p:ext>
-    </p:extLst>
-  </p:cSld>
-  <p:clrMapOvr>
-    <a:masterClrMapping/>
-  </p:clrMapOvr>
-  <p:timing>
-    <p:tnLst>
-      <p:par>
-        <p:cTn id="1" dur="indefinite" restart="never" nodeType="tmRoot"/>
-      </p:par>
-    </p:tnLst>
-  </p:timing>
-</p:sld>
-</file>
-
-<file path=ppt/slides/slide6.xml><?xml version="1.0" encoding="utf-8"?>
-<p:sld xmlns:a="http://schemas.openxmlformats.org/drawingml/2006/main" xmlns:r="http://schemas.openxmlformats.org/officeDocument/2006/relationships" xmlns:p="http://schemas.openxmlformats.org/presentationml/2006/main">
-  <p:cSld>
-    <p:spTree>
-      <p:nvGrpSpPr>
-        <p:cNvPr id="1" name=""/>
-        <p:cNvGrpSpPr/>
-        <p:nvPr/>
-      </p:nvGrpSpPr>
-      <p:grpSpPr>
-        <a:xfrm>
-          <a:off x="0" y="0"/>
-          <a:ext cx="0" cy="0"/>
-          <a:chOff x="0" y="0"/>
-          <a:chExt cx="0" cy="0"/>
-        </a:xfrm>
-      </p:grpSpPr>
-      <p:sp>
-        <p:nvSpPr>
-          <p:cNvPr id="2" name="Título 1"/>
-          <p:cNvSpPr>
-            <a:spLocks noGrp="1"/>
-          </p:cNvSpPr>
-          <p:nvPr>
-            <p:ph type="title"/>
-          </p:nvPr>
-        </p:nvSpPr>
-        <p:spPr>
-          <a:xfrm>
-            <a:off x="1141412" y="0"/>
-            <a:ext cx="9905998" cy="1478570"/>
-          </a:xfrm>
-        </p:spPr>
-        <p:txBody>
-          <a:bodyPr/>
-          <a:lstStyle/>
-          <a:p>
-            <a:r>
-              <a:rPr lang="pt-BR" dirty="0" smtClean="0"/>
-              <a:t>Instituições privadas lucrativas</a:t>
-            </a:r>
-            <a:endParaRPr lang="pt-BR" dirty="0"/>
-          </a:p>
-        </p:txBody>
-      </p:sp>
-      <p:pic>
-        <p:nvPicPr>
-          <p:cNvPr id="4" name="Imagem 3"/>
-          <p:cNvPicPr>
-            <a:picLocks noChangeAspect="1"/>
-          </p:cNvPicPr>
-          <p:nvPr/>
-        </p:nvPicPr>
-        <p:blipFill>
-          <a:blip r:embed="rId2">
-            <a:extLst>
-              <a:ext uri="{28A0092B-C50C-407E-A947-70E740481C1C}">
-                <a14:useLocalDpi xmlns:a14="http://schemas.microsoft.com/office/drawing/2010/main" val="0"/>
-              </a:ext>
-            </a:extLst>
-          </a:blip>
-          <a:stretch>
-            <a:fillRect/>
-          </a:stretch>
-        </p:blipFill>
-        <p:spPr>
-          <a:xfrm>
-            <a:off x="118995" y="1227910"/>
-            <a:ext cx="11872708" cy="5519158"/>
-          </a:xfrm>
-          <a:prstGeom prst="rect">
-            <a:avLst/>
-          </a:prstGeom>
-        </p:spPr>
-      </p:pic>
-      <p:sp>
-        <p:nvSpPr>
-          <p:cNvPr id="5" name="CaixaDeTexto 4"/>
-          <p:cNvSpPr txBox="1"/>
-          <p:nvPr/>
-        </p:nvSpPr>
-        <p:spPr>
-          <a:xfrm>
-            <a:off x="9366069" y="1789612"/>
-            <a:ext cx="2468880" cy="2127418"/>
-          </a:xfrm>
-          <a:prstGeom prst="rect">
-            <a:avLst/>
-          </a:prstGeom>
-          <a:solidFill>
-            <a:schemeClr val="tx1"/>
-          </a:solidFill>
-        </p:spPr>
-        <p:style>
-          <a:lnRef idx="2">
-            <a:schemeClr val="accent5"/>
-          </a:lnRef>
-          <a:fillRef idx="1">
-            <a:schemeClr val="lt1"/>
-          </a:fillRef>
-          <a:effectRef idx="0">
-            <a:schemeClr val="accent5"/>
-          </a:effectRef>
-          <a:fontRef idx="minor">
-            <a:schemeClr val="dk1"/>
-          </a:fontRef>
-        </p:style>
-        <p:txBody>
-          <a:bodyPr wrap="square" rtlCol="0">
-            <a:spAutoFit/>
-          </a:bodyPr>
-          <a:lstStyle/>
-          <a:p>
-            <a:r>
-              <a:rPr lang="en-US" sz="1600" dirty="0"/>
-              <a:t>count    2094.000000</a:t>
-            </a:r>
-          </a:p>
-          <a:p>
-            <a:r>
-              <a:rPr lang="en-US" sz="1600" dirty="0"/>
-              <a:t>mean       37.584384</a:t>
-            </a:r>
-          </a:p>
-          <a:p>
-            <a:r>
-              <a:rPr lang="en-US" sz="1600" dirty="0" err="1"/>
-              <a:t>std</a:t>
-            </a:r>
-            <a:r>
-              <a:rPr lang="en-US" sz="1600" dirty="0"/>
-              <a:t>        10.722355</a:t>
-            </a:r>
-          </a:p>
-          <a:p>
-            <a:r>
-              <a:rPr lang="en-US" sz="1600" dirty="0"/>
-              <a:t>min         0.000000</a:t>
-            </a:r>
-          </a:p>
-          <a:p>
-            <a:r>
-              <a:rPr lang="en-US" sz="1600" dirty="0"/>
-              <a:t>25%        30.600000</a:t>
-            </a:r>
-          </a:p>
-          <a:p>
-            <a:r>
-              <a:rPr lang="en-US" sz="1600" dirty="0"/>
-              <a:t>50%        36.800000</a:t>
-            </a:r>
-          </a:p>
-          <a:p>
-            <a:r>
-              <a:rPr lang="en-US" sz="1600" dirty="0"/>
-              <a:t>75%        44.200000</a:t>
-            </a:r>
-          </a:p>
-          <a:p>
-            <a:r>
-              <a:rPr lang="en-US" sz="1600" dirty="0"/>
-              <a:t>max        76.000000</a:t>
-            </a:r>
-            <a:endParaRPr lang="pt-BR" sz="1600" dirty="0"/>
-          </a:p>
-        </p:txBody>
-      </p:sp>
-    </p:spTree>
-    <p:extLst>
-      <p:ext uri="{BB962C8B-B14F-4D97-AF65-F5344CB8AC3E}">
-        <p14:creationId xmlns:p14="http://schemas.microsoft.com/office/powerpoint/2010/main" val="103572150"/>
-      </p:ext>
-    </p:extLst>
-  </p:cSld>
-  <p:clrMapOvr>
-    <a:masterClrMapping/>
-  </p:clrMapOvr>
-  <p:timing>
-    <p:tnLst>
-      <p:par>
-        <p:cTn id="1" dur="indefinite" restart="never" nodeType="tmRoot"/>
-      </p:par>
-    </p:tnLst>
-  </p:timing>
-</p:sld>
-</file>
-
-<file path=ppt/slides/slide7.xml><?xml version="1.0" encoding="utf-8"?>
-<p:sld xmlns:a="http://schemas.openxmlformats.org/drawingml/2006/main" xmlns:r="http://schemas.openxmlformats.org/officeDocument/2006/relationships" xmlns:p="http://schemas.openxmlformats.org/presentationml/2006/main">
-  <p:cSld>
-    <p:spTree>
-      <p:nvGrpSpPr>
-        <p:cNvPr id="1" name=""/>
-        <p:cNvGrpSpPr/>
-        <p:nvPr/>
-      </p:nvGrpSpPr>
-      <p:grpSpPr>
-        <a:xfrm>
-          <a:off x="0" y="0"/>
-          <a:ext cx="0" cy="0"/>
-          <a:chOff x="0" y="0"/>
-          <a:chExt cx="0" cy="0"/>
-        </a:xfrm>
-      </p:grpSpPr>
-      <p:sp>
-        <p:nvSpPr>
-          <p:cNvPr id="2" name="Título 1"/>
-          <p:cNvSpPr>
-            <a:spLocks noGrp="1"/>
-          </p:cNvSpPr>
-          <p:nvPr>
-            <p:ph type="title"/>
-          </p:nvPr>
-        </p:nvSpPr>
-        <p:spPr>
-          <a:xfrm>
-            <a:off x="1141413" y="0"/>
-            <a:ext cx="9905998" cy="1478570"/>
-          </a:xfrm>
-        </p:spPr>
-        <p:txBody>
-          <a:bodyPr/>
-          <a:lstStyle/>
-          <a:p>
-            <a:r>
-              <a:rPr lang="pt-BR" dirty="0" smtClean="0"/>
-              <a:t>Instituições Privadas não lucrativas</a:t>
-            </a:r>
-            <a:endParaRPr lang="pt-BR" dirty="0"/>
-          </a:p>
-        </p:txBody>
-      </p:sp>
-      <p:pic>
-        <p:nvPicPr>
-          <p:cNvPr id="4" name="Imagem 3"/>
-          <p:cNvPicPr>
-            <a:picLocks noChangeAspect="1"/>
-          </p:cNvPicPr>
-          <p:nvPr/>
-        </p:nvPicPr>
-        <p:blipFill>
-          <a:blip r:embed="rId2">
-            <a:extLst>
-              <a:ext uri="{28A0092B-C50C-407E-A947-70E740481C1C}">
-                <a14:useLocalDpi xmlns:a14="http://schemas.microsoft.com/office/drawing/2010/main" val="0"/>
-              </a:ext>
-            </a:extLst>
-          </a:blip>
-          <a:stretch>
-            <a:fillRect/>
-          </a:stretch>
-        </p:blipFill>
-        <p:spPr>
-          <a:xfrm>
-            <a:off x="117019" y="1175657"/>
-            <a:ext cx="11900809" cy="5532221"/>
-          </a:xfrm>
-          <a:prstGeom prst="rect">
-            <a:avLst/>
-          </a:prstGeom>
-        </p:spPr>
-      </p:pic>
-      <p:sp>
-        <p:nvSpPr>
-          <p:cNvPr id="5" name="CaixaDeTexto 4"/>
-          <p:cNvSpPr txBox="1"/>
-          <p:nvPr/>
-        </p:nvSpPr>
-        <p:spPr>
-          <a:xfrm>
-            <a:off x="9326880" y="1685109"/>
-            <a:ext cx="2547257" cy="2062103"/>
-          </a:xfrm>
-          <a:prstGeom prst="rect">
-            <a:avLst/>
-          </a:prstGeom>
-          <a:solidFill>
-            <a:schemeClr val="tx1"/>
-          </a:solidFill>
-        </p:spPr>
-        <p:style>
-          <a:lnRef idx="2">
-            <a:schemeClr val="accent2"/>
-          </a:lnRef>
-          <a:fillRef idx="1">
-            <a:schemeClr val="lt1"/>
-          </a:fillRef>
-          <a:effectRef idx="0">
-            <a:schemeClr val="accent2"/>
-          </a:effectRef>
-          <a:fontRef idx="minor">
-            <a:schemeClr val="dk1"/>
-          </a:fontRef>
-        </p:style>
-        <p:txBody>
-          <a:bodyPr wrap="square" rtlCol="0">
-            <a:spAutoFit/>
-          </a:bodyPr>
-          <a:lstStyle/>
-          <a:p>
-            <a:r>
-              <a:rPr lang="en-US" sz="1600" dirty="0"/>
-              <a:t>count    2469.000000</a:t>
-            </a:r>
-          </a:p>
-          <a:p>
-            <a:r>
-              <a:rPr lang="en-US" sz="1600" dirty="0"/>
-              <a:t>mean       39.734305</a:t>
-            </a:r>
-          </a:p>
-          <a:p>
-            <a:r>
-              <a:rPr lang="en-US" sz="1600" dirty="0" err="1"/>
-              <a:t>std</a:t>
-            </a:r>
-            <a:r>
-              <a:rPr lang="en-US" sz="1600" dirty="0"/>
-              <a:t>        12.545465</a:t>
-            </a:r>
-          </a:p>
-          <a:p>
-            <a:r>
-              <a:rPr lang="en-US" sz="1600" dirty="0"/>
-              <a:t>min         0.000000</a:t>
-            </a:r>
-          </a:p>
-          <a:p>
-            <a:r>
-              <a:rPr lang="en-US" sz="1600" dirty="0"/>
-              <a:t>25%        31.100000</a:t>
-            </a:r>
-          </a:p>
-          <a:p>
-            <a:r>
-              <a:rPr lang="en-US" sz="1600" dirty="0"/>
-              <a:t>50%        39.000000</a:t>
-            </a:r>
-          </a:p>
-          <a:p>
-            <a:r>
-              <a:rPr lang="en-US" sz="1600" dirty="0"/>
-              <a:t>75%        47.900000</a:t>
-            </a:r>
-          </a:p>
-          <a:p>
-            <a:r>
-              <a:rPr lang="en-US" sz="1600" dirty="0"/>
-              <a:t>max        93.300000</a:t>
-            </a:r>
-            <a:endParaRPr lang="pt-BR" sz="1600" dirty="0"/>
-          </a:p>
-        </p:txBody>
-      </p:sp>
-    </p:spTree>
-    <p:extLst>
-      <p:ext uri="{BB962C8B-B14F-4D97-AF65-F5344CB8AC3E}">
-        <p14:creationId xmlns:p14="http://schemas.microsoft.com/office/powerpoint/2010/main" val="1517287795"/>
-      </p:ext>
-    </p:extLst>
-  </p:cSld>
-  <p:clrMapOvr>
-    <a:masterClrMapping/>
-  </p:clrMapOvr>
-  <p:timing>
-    <p:tnLst>
-      <p:par>
-        <p:cTn id="1" dur="indefinite" restart="never" nodeType="tmRoot"/>
-      </p:par>
-    </p:tnLst>
-  </p:timing>
-</p:sld>
-</file>
-
-<file path=ppt/slides/slide8.xml><?xml version="1.0" encoding="utf-8"?>
+<file path=ppt/slides/slide12.xml><?xml version="1.0" encoding="utf-8"?>
 <p:sld xmlns:a="http://schemas.openxmlformats.org/drawingml/2006/main" xmlns:r="http://schemas.openxmlformats.org/officeDocument/2006/relationships" xmlns:p="http://schemas.openxmlformats.org/presentationml/2006/main">
   <p:cSld>
     <p:spTree>
@@ -13962,7 +12914,7 @@
 </p:sld>
 </file>
 
-<file path=ppt/slides/slide9.xml><?xml version="1.0" encoding="utf-8"?>
+<file path=ppt/slides/slide13.xml><?xml version="1.0" encoding="utf-8"?>
 <p:sld xmlns:a="http://schemas.openxmlformats.org/drawingml/2006/main" xmlns:r="http://schemas.openxmlformats.org/officeDocument/2006/relationships" xmlns:p="http://schemas.openxmlformats.org/presentationml/2006/main">
   <p:cSld>
     <p:spTree>
@@ -14031,28 +12983,28 @@
                 <a:gridCol w="2445079">
                   <a:extLst>
                     <a:ext uri="{9D8B030D-6E8A-4147-A177-3AD203B41FA5}">
-                      <a16:colId xmlns:a16="http://schemas.microsoft.com/office/drawing/2014/main" val="3078037120"/>
+                      <a16:colId xmlns:a16="http://schemas.microsoft.com/office/drawing/2014/main" xmlns="" val="3078037120"/>
                     </a:ext>
                   </a:extLst>
                 </a:gridCol>
                 <a:gridCol w="2445079">
                   <a:extLst>
                     <a:ext uri="{9D8B030D-6E8A-4147-A177-3AD203B41FA5}">
-                      <a16:colId xmlns:a16="http://schemas.microsoft.com/office/drawing/2014/main" val="3156660994"/>
+                      <a16:colId xmlns:a16="http://schemas.microsoft.com/office/drawing/2014/main" xmlns="" val="3156660994"/>
                     </a:ext>
                   </a:extLst>
                 </a:gridCol>
                 <a:gridCol w="2445079">
                   <a:extLst>
                     <a:ext uri="{9D8B030D-6E8A-4147-A177-3AD203B41FA5}">
-                      <a16:colId xmlns:a16="http://schemas.microsoft.com/office/drawing/2014/main" val="2536979040"/>
+                      <a16:colId xmlns:a16="http://schemas.microsoft.com/office/drawing/2014/main" xmlns="" val="2536979040"/>
                     </a:ext>
                   </a:extLst>
                 </a:gridCol>
                 <a:gridCol w="2445079">
                   <a:extLst>
                     <a:ext uri="{9D8B030D-6E8A-4147-A177-3AD203B41FA5}">
-                      <a16:colId xmlns:a16="http://schemas.microsoft.com/office/drawing/2014/main" val="398647426"/>
+                      <a16:colId xmlns:a16="http://schemas.microsoft.com/office/drawing/2014/main" xmlns="" val="398647426"/>
                     </a:ext>
                   </a:extLst>
                 </a:gridCol>
@@ -14152,7 +13104,7 @@
                 </a:tc>
                 <a:extLst>
                   <a:ext uri="{0D108BD9-81ED-4DB2-BD59-A6C34878D82A}">
-                    <a16:rowId xmlns:a16="http://schemas.microsoft.com/office/drawing/2014/main" val="3033316714"/>
+                    <a16:rowId xmlns:a16="http://schemas.microsoft.com/office/drawing/2014/main" xmlns="" val="3033316714"/>
                   </a:ext>
                 </a:extLst>
               </a:tr>
@@ -14215,7 +13167,7 @@
                 </a:tc>
                 <a:extLst>
                   <a:ext uri="{0D108BD9-81ED-4DB2-BD59-A6C34878D82A}">
-                    <a16:rowId xmlns:a16="http://schemas.microsoft.com/office/drawing/2014/main" val="2345641513"/>
+                    <a16:rowId xmlns:a16="http://schemas.microsoft.com/office/drawing/2014/main" xmlns="" val="2345641513"/>
                   </a:ext>
                 </a:extLst>
               </a:tr>
@@ -14278,7 +13230,7 @@
                 </a:tc>
                 <a:extLst>
                   <a:ext uri="{0D108BD9-81ED-4DB2-BD59-A6C34878D82A}">
-                    <a16:rowId xmlns:a16="http://schemas.microsoft.com/office/drawing/2014/main" val="1234176951"/>
+                    <a16:rowId xmlns:a16="http://schemas.microsoft.com/office/drawing/2014/main" xmlns="" val="1234176951"/>
                   </a:ext>
                 </a:extLst>
               </a:tr>
@@ -14341,7 +13293,7 @@
                 </a:tc>
                 <a:extLst>
                   <a:ext uri="{0D108BD9-81ED-4DB2-BD59-A6C34878D82A}">
-                    <a16:rowId xmlns:a16="http://schemas.microsoft.com/office/drawing/2014/main" val="4133296138"/>
+                    <a16:rowId xmlns:a16="http://schemas.microsoft.com/office/drawing/2014/main" xmlns="" val="4133296138"/>
                   </a:ext>
                 </a:extLst>
               </a:tr>
@@ -14404,7 +13356,7 @@
                 </a:tc>
                 <a:extLst>
                   <a:ext uri="{0D108BD9-81ED-4DB2-BD59-A6C34878D82A}">
-                    <a16:rowId xmlns:a16="http://schemas.microsoft.com/office/drawing/2014/main" val="2716157877"/>
+                    <a16:rowId xmlns:a16="http://schemas.microsoft.com/office/drawing/2014/main" xmlns="" val="2716157877"/>
                   </a:ext>
                 </a:extLst>
               </a:tr>
@@ -14475,7 +13427,7 @@
                 </a:tc>
                 <a:extLst>
                   <a:ext uri="{0D108BD9-81ED-4DB2-BD59-A6C34878D82A}">
-                    <a16:rowId xmlns:a16="http://schemas.microsoft.com/office/drawing/2014/main" val="2861312823"/>
+                    <a16:rowId xmlns:a16="http://schemas.microsoft.com/office/drawing/2014/main" xmlns="" val="2861312823"/>
                   </a:ext>
                 </a:extLst>
               </a:tr>
@@ -14487,6 +13439,1469 @@
     <p:extLst>
       <p:ext uri="{BB962C8B-B14F-4D97-AF65-F5344CB8AC3E}">
         <p14:creationId xmlns:p14="http://schemas.microsoft.com/office/powerpoint/2010/main" val="181543548"/>
+      </p:ext>
+    </p:extLst>
+  </p:cSld>
+  <p:clrMapOvr>
+    <a:masterClrMapping/>
+  </p:clrMapOvr>
+  <p:timing>
+    <p:tnLst>
+      <p:par>
+        <p:cTn id="1" dur="indefinite" restart="never" nodeType="tmRoot"/>
+      </p:par>
+    </p:tnLst>
+  </p:timing>
+</p:sld>
+</file>
+
+<file path=ppt/slides/slide14.xml><?xml version="1.0" encoding="utf-8"?>
+<p:sld xmlns:a="http://schemas.openxmlformats.org/drawingml/2006/main" xmlns:r="http://schemas.openxmlformats.org/officeDocument/2006/relationships" xmlns:p="http://schemas.openxmlformats.org/presentationml/2006/main">
+  <p:cSld>
+    <p:spTree>
+      <p:nvGrpSpPr>
+        <p:cNvPr id="1" name=""/>
+        <p:cNvGrpSpPr/>
+        <p:nvPr/>
+      </p:nvGrpSpPr>
+      <p:grpSpPr>
+        <a:xfrm>
+          <a:off x="0" y="0"/>
+          <a:ext cx="0" cy="0"/>
+          <a:chOff x="0" y="0"/>
+          <a:chExt cx="0" cy="0"/>
+        </a:xfrm>
+      </p:grpSpPr>
+      <p:sp>
+        <p:nvSpPr>
+          <p:cNvPr id="2" name="Título 1"/>
+          <p:cNvSpPr>
+            <a:spLocks noGrp="1"/>
+          </p:cNvSpPr>
+          <p:nvPr>
+            <p:ph type="title"/>
+          </p:nvPr>
+        </p:nvSpPr>
+        <p:spPr>
+          <a:xfrm>
+            <a:off x="1141413" y="195943"/>
+            <a:ext cx="9905998" cy="744583"/>
+          </a:xfrm>
+        </p:spPr>
+        <p:txBody>
+          <a:bodyPr>
+            <a:normAutofit/>
+          </a:bodyPr>
+          <a:lstStyle/>
+          <a:p>
+            <a:r>
+              <a:rPr lang="pt-BR" dirty="0" smtClean="0"/>
+              <a:t>gráfico</a:t>
+            </a:r>
+            <a:endParaRPr lang="pt-BR" dirty="0"/>
+          </a:p>
+        </p:txBody>
+      </p:sp>
+      <p:pic>
+        <p:nvPicPr>
+          <p:cNvPr id="4" name="Imagem 3"/>
+          <p:cNvPicPr>
+            <a:picLocks noChangeAspect="1"/>
+          </p:cNvPicPr>
+          <p:nvPr/>
+        </p:nvPicPr>
+        <p:blipFill>
+          <a:blip r:embed="rId2">
+            <a:extLst>
+              <a:ext uri="{28A0092B-C50C-407E-A947-70E740481C1C}">
+                <a14:useLocalDpi xmlns:a14="http://schemas.microsoft.com/office/drawing/2010/main" val="0"/>
+              </a:ext>
+            </a:extLst>
+          </a:blip>
+          <a:stretch>
+            <a:fillRect/>
+          </a:stretch>
+        </p:blipFill>
+        <p:spPr>
+          <a:xfrm>
+            <a:off x="312609" y="1188720"/>
+            <a:ext cx="11563605" cy="5375468"/>
+          </a:xfrm>
+          <a:prstGeom prst="rect">
+            <a:avLst/>
+          </a:prstGeom>
+        </p:spPr>
+      </p:pic>
+    </p:spTree>
+    <p:extLst>
+      <p:ext uri="{BB962C8B-B14F-4D97-AF65-F5344CB8AC3E}">
+        <p14:creationId xmlns:p14="http://schemas.microsoft.com/office/powerpoint/2010/main" val="1477976766"/>
+      </p:ext>
+    </p:extLst>
+  </p:cSld>
+  <p:clrMapOvr>
+    <a:masterClrMapping/>
+  </p:clrMapOvr>
+  <p:timing>
+    <p:tnLst>
+      <p:par>
+        <p:cTn id="1" dur="indefinite" restart="never" nodeType="tmRoot"/>
+      </p:par>
+    </p:tnLst>
+  </p:timing>
+</p:sld>
+</file>
+
+<file path=ppt/slides/slide15.xml><?xml version="1.0" encoding="utf-8"?>
+<p:sld xmlns:a="http://schemas.openxmlformats.org/drawingml/2006/main" xmlns:r="http://schemas.openxmlformats.org/officeDocument/2006/relationships" xmlns:p="http://schemas.openxmlformats.org/presentationml/2006/main">
+  <p:cSld>
+    <p:spTree>
+      <p:nvGrpSpPr>
+        <p:cNvPr id="1" name=""/>
+        <p:cNvGrpSpPr/>
+        <p:nvPr/>
+      </p:nvGrpSpPr>
+      <p:grpSpPr>
+        <a:xfrm>
+          <a:off x="0" y="0"/>
+          <a:ext cx="0" cy="0"/>
+          <a:chOff x="0" y="0"/>
+          <a:chExt cx="0" cy="0"/>
+        </a:xfrm>
+      </p:grpSpPr>
+      <p:pic>
+        <p:nvPicPr>
+          <p:cNvPr id="6" name="Imagem 5"/>
+          <p:cNvPicPr>
+            <a:picLocks noChangeAspect="1"/>
+          </p:cNvPicPr>
+          <p:nvPr/>
+        </p:nvPicPr>
+        <p:blipFill>
+          <a:blip r:embed="rId2">
+            <a:extLst>
+              <a:ext uri="{28A0092B-C50C-407E-A947-70E740481C1C}">
+                <a14:useLocalDpi xmlns:a14="http://schemas.microsoft.com/office/drawing/2010/main" val="0"/>
+              </a:ext>
+            </a:extLst>
+          </a:blip>
+          <a:stretch>
+            <a:fillRect/>
+          </a:stretch>
+        </p:blipFill>
+        <p:spPr>
+          <a:xfrm>
+            <a:off x="1288878" y="1659987"/>
+            <a:ext cx="9699483" cy="3327926"/>
+          </a:xfrm>
+          <a:prstGeom prst="rect">
+            <a:avLst/>
+          </a:prstGeom>
+        </p:spPr>
+      </p:pic>
+    </p:spTree>
+    <p:extLst>
+      <p:ext uri="{BB962C8B-B14F-4D97-AF65-F5344CB8AC3E}">
+        <p14:creationId xmlns:p14="http://schemas.microsoft.com/office/powerpoint/2010/main" val="4269556997"/>
+      </p:ext>
+    </p:extLst>
+  </p:cSld>
+  <p:clrMapOvr>
+    <a:masterClrMapping/>
+  </p:clrMapOvr>
+</p:sld>
+</file>
+
+<file path=ppt/slides/slide2.xml><?xml version="1.0" encoding="utf-8"?>
+<p:sld xmlns:a="http://schemas.openxmlformats.org/drawingml/2006/main" xmlns:r="http://schemas.openxmlformats.org/officeDocument/2006/relationships" xmlns:p="http://schemas.openxmlformats.org/presentationml/2006/main">
+  <p:cSld>
+    <p:spTree>
+      <p:nvGrpSpPr>
+        <p:cNvPr id="1" name=""/>
+        <p:cNvGrpSpPr/>
+        <p:nvPr/>
+      </p:nvGrpSpPr>
+      <p:grpSpPr>
+        <a:xfrm>
+          <a:off x="0" y="0"/>
+          <a:ext cx="0" cy="0"/>
+          <a:chOff x="0" y="0"/>
+          <a:chExt cx="0" cy="0"/>
+        </a:xfrm>
+      </p:grpSpPr>
+      <p:sp>
+        <p:nvSpPr>
+          <p:cNvPr id="2" name="Título 1"/>
+          <p:cNvSpPr>
+            <a:spLocks noGrp="1"/>
+          </p:cNvSpPr>
+          <p:nvPr>
+            <p:ph type="title"/>
+          </p:nvPr>
+        </p:nvSpPr>
+        <p:spPr>
+          <a:xfrm>
+            <a:off x="1141412" y="0"/>
+            <a:ext cx="9905998" cy="1478570"/>
+          </a:xfrm>
+        </p:spPr>
+        <p:txBody>
+          <a:bodyPr/>
+          <a:lstStyle/>
+          <a:p>
+            <a:r>
+              <a:rPr lang="pt-BR" dirty="0" err="1" smtClean="0"/>
+              <a:t>enade</a:t>
+            </a:r>
+            <a:endParaRPr lang="pt-BR" dirty="0"/>
+          </a:p>
+        </p:txBody>
+      </p:sp>
+      <p:sp>
+        <p:nvSpPr>
+          <p:cNvPr id="3" name="Espaço Reservado para Conteúdo 2"/>
+          <p:cNvSpPr>
+            <a:spLocks noGrp="1"/>
+          </p:cNvSpPr>
+          <p:nvPr>
+            <p:ph idx="1"/>
+          </p:nvPr>
+        </p:nvSpPr>
+        <p:spPr>
+          <a:xfrm>
+            <a:off x="1141412" y="1293223"/>
+            <a:ext cx="9905999" cy="4497978"/>
+          </a:xfrm>
+        </p:spPr>
+        <p:txBody>
+          <a:bodyPr/>
+          <a:lstStyle/>
+          <a:p>
+            <a:r>
+              <a:rPr lang="pt-BR" dirty="0"/>
+              <a:t>O Exame Nacional de Desempenho de Estudantes (</a:t>
+            </a:r>
+            <a:r>
+              <a:rPr lang="pt-BR" dirty="0" err="1"/>
+              <a:t>Enade</a:t>
+            </a:r>
+            <a:r>
+              <a:rPr lang="pt-BR" dirty="0"/>
+              <a:t>) avalia o rendimento dos concluintes dos cursos de graduação, em relação aos conteúdos programáticos, habilidades e competências adquiridas em sua formação. </a:t>
+            </a:r>
+            <a:endParaRPr lang="pt-BR" dirty="0" smtClean="0"/>
+          </a:p>
+          <a:p>
+            <a:r>
+              <a:rPr lang="pt-BR" dirty="0"/>
+              <a:t>O objetivo do </a:t>
+            </a:r>
+            <a:r>
+              <a:rPr lang="pt-BR" dirty="0" err="1"/>
+              <a:t>Enade</a:t>
+            </a:r>
+            <a:r>
+              <a:rPr lang="pt-BR" dirty="0"/>
+              <a:t> é avaliar o desempenho dos estudantes com relação aos conteúdos programáticos previstos nas diretrizes curriculares dos cursos de graduação, o desenvolvimento de competências e habilidades necessárias ao aprofundamento da formação geral e profissional, e o nível de atualização dos estudantes com relação à realidade brasileira e </a:t>
+            </a:r>
+            <a:r>
+              <a:rPr lang="pt-BR" dirty="0" smtClean="0"/>
+              <a:t>mundial.</a:t>
+            </a:r>
+            <a:endParaRPr lang="pt-BR" dirty="0"/>
+          </a:p>
+        </p:txBody>
+      </p:sp>
+    </p:spTree>
+    <p:extLst>
+      <p:ext uri="{BB962C8B-B14F-4D97-AF65-F5344CB8AC3E}">
+        <p14:creationId xmlns:p14="http://schemas.microsoft.com/office/powerpoint/2010/main" val="3084386775"/>
+      </p:ext>
+    </p:extLst>
+  </p:cSld>
+  <p:clrMapOvr>
+    <a:masterClrMapping/>
+  </p:clrMapOvr>
+  <p:timing>
+    <p:tnLst>
+      <p:par>
+        <p:cTn id="1" dur="indefinite" restart="never" nodeType="tmRoot"/>
+      </p:par>
+    </p:tnLst>
+  </p:timing>
+</p:sld>
+</file>
+
+<file path=ppt/slides/slide3.xml><?xml version="1.0" encoding="utf-8"?>
+<p:sld xmlns:a="http://schemas.openxmlformats.org/drawingml/2006/main" xmlns:r="http://schemas.openxmlformats.org/officeDocument/2006/relationships" xmlns:p="http://schemas.openxmlformats.org/presentationml/2006/main">
+  <p:cSld>
+    <p:spTree>
+      <p:nvGrpSpPr>
+        <p:cNvPr id="1" name=""/>
+        <p:cNvGrpSpPr/>
+        <p:nvPr/>
+      </p:nvGrpSpPr>
+      <p:grpSpPr>
+        <a:xfrm>
+          <a:off x="0" y="0"/>
+          <a:ext cx="0" cy="0"/>
+          <a:chOff x="0" y="0"/>
+          <a:chExt cx="0" cy="0"/>
+        </a:xfrm>
+      </p:grpSpPr>
+      <p:sp>
+        <p:nvSpPr>
+          <p:cNvPr id="2" name="Título 1"/>
+          <p:cNvSpPr>
+            <a:spLocks noGrp="1"/>
+          </p:cNvSpPr>
+          <p:nvPr>
+            <p:ph type="title"/>
+          </p:nvPr>
+        </p:nvSpPr>
+        <p:spPr>
+          <a:xfrm>
+            <a:off x="1232853" y="-152190"/>
+            <a:ext cx="9905998" cy="909836"/>
+          </a:xfrm>
+        </p:spPr>
+        <p:txBody>
+          <a:bodyPr>
+            <a:normAutofit fontScale="90000"/>
+          </a:bodyPr>
+          <a:lstStyle/>
+          <a:p>
+            <a:r>
+              <a:rPr lang="pt-BR" dirty="0" smtClean="0"/>
+              <a:t/>
+            </a:r>
+            <a:br>
+              <a:rPr lang="pt-BR" dirty="0" smtClean="0"/>
+            </a:br>
+            <a:r>
+              <a:rPr lang="pt-BR" dirty="0"/>
+              <a:t/>
+            </a:r>
+            <a:br>
+              <a:rPr lang="pt-BR" dirty="0"/>
+            </a:br>
+            <a:r>
+              <a:rPr lang="pt-BR" dirty="0" smtClean="0"/>
+              <a:t>Instituições Federais</a:t>
+            </a:r>
+            <a:endParaRPr lang="pt-BR" dirty="0"/>
+          </a:p>
+        </p:txBody>
+      </p:sp>
+      <p:pic>
+        <p:nvPicPr>
+          <p:cNvPr id="5" name="Imagem 4"/>
+          <p:cNvPicPr>
+            <a:picLocks noChangeAspect="1"/>
+          </p:cNvPicPr>
+          <p:nvPr/>
+        </p:nvPicPr>
+        <p:blipFill>
+          <a:blip r:embed="rId2">
+            <a:extLst>
+              <a:ext uri="{28A0092B-C50C-407E-A947-70E740481C1C}">
+                <a14:useLocalDpi xmlns:a14="http://schemas.microsoft.com/office/drawing/2010/main" val="0"/>
+              </a:ext>
+            </a:extLst>
+          </a:blip>
+          <a:stretch>
+            <a:fillRect/>
+          </a:stretch>
+        </p:blipFill>
+        <p:spPr>
+          <a:xfrm>
+            <a:off x="308342" y="1240973"/>
+            <a:ext cx="11479300" cy="5336278"/>
+          </a:xfrm>
+          <a:prstGeom prst="rect">
+            <a:avLst/>
+          </a:prstGeom>
+        </p:spPr>
+      </p:pic>
+      <p:sp>
+        <p:nvSpPr>
+          <p:cNvPr id="6" name="CaixaDeTexto 5"/>
+          <p:cNvSpPr txBox="1"/>
+          <p:nvPr/>
+        </p:nvSpPr>
+        <p:spPr>
+          <a:xfrm>
+            <a:off x="9366070" y="1828799"/>
+            <a:ext cx="2325188" cy="2062103"/>
+          </a:xfrm>
+          <a:prstGeom prst="rect">
+            <a:avLst/>
+          </a:prstGeom>
+        </p:spPr>
+        <p:style>
+          <a:lnRef idx="2">
+            <a:schemeClr val="accent1"/>
+          </a:lnRef>
+          <a:fillRef idx="1">
+            <a:schemeClr val="lt1"/>
+          </a:fillRef>
+          <a:effectRef idx="0">
+            <a:schemeClr val="accent1"/>
+          </a:effectRef>
+          <a:fontRef idx="minor">
+            <a:schemeClr val="dk1"/>
+          </a:fontRef>
+        </p:style>
+        <p:txBody>
+          <a:bodyPr wrap="square" rtlCol="0">
+            <a:spAutoFit/>
+          </a:bodyPr>
+          <a:lstStyle/>
+          <a:p>
+            <a:r>
+              <a:rPr lang="en-US" sz="1600" dirty="0">
+                <a:solidFill>
+                  <a:schemeClr val="bg1"/>
+                </a:solidFill>
+              </a:rPr>
+              <a:t>count    2706.000000</a:t>
+            </a:r>
+          </a:p>
+          <a:p>
+            <a:r>
+              <a:rPr lang="en-US" sz="1600" dirty="0">
+                <a:solidFill>
+                  <a:schemeClr val="bg1"/>
+                </a:solidFill>
+              </a:rPr>
+              <a:t>mean       50.699815</a:t>
+            </a:r>
+          </a:p>
+          <a:p>
+            <a:r>
+              <a:rPr lang="en-US" sz="1600" dirty="0" err="1">
+                <a:solidFill>
+                  <a:schemeClr val="bg1"/>
+                </a:solidFill>
+              </a:rPr>
+              <a:t>std</a:t>
+            </a:r>
+            <a:r>
+              <a:rPr lang="en-US" sz="1600" dirty="0">
+                <a:solidFill>
+                  <a:schemeClr val="bg1"/>
+                </a:solidFill>
+              </a:rPr>
+              <a:t>        13.312321</a:t>
+            </a:r>
+          </a:p>
+          <a:p>
+            <a:r>
+              <a:rPr lang="en-US" sz="1600" dirty="0">
+                <a:solidFill>
+                  <a:schemeClr val="bg1"/>
+                </a:solidFill>
+              </a:rPr>
+              <a:t>min         0.000000</a:t>
+            </a:r>
+          </a:p>
+          <a:p>
+            <a:r>
+              <a:rPr lang="en-US" sz="1600" dirty="0">
+                <a:solidFill>
+                  <a:schemeClr val="bg1"/>
+                </a:solidFill>
+              </a:rPr>
+              <a:t>25%        41.525000</a:t>
+            </a:r>
+          </a:p>
+          <a:p>
+            <a:r>
+              <a:rPr lang="en-US" sz="1600" dirty="0">
+                <a:solidFill>
+                  <a:schemeClr val="bg1"/>
+                </a:solidFill>
+              </a:rPr>
+              <a:t>50%        51.100000</a:t>
+            </a:r>
+          </a:p>
+          <a:p>
+            <a:r>
+              <a:rPr lang="en-US" sz="1600" dirty="0">
+                <a:solidFill>
+                  <a:schemeClr val="bg1"/>
+                </a:solidFill>
+              </a:rPr>
+              <a:t>75%        60.175000</a:t>
+            </a:r>
+          </a:p>
+          <a:p>
+            <a:r>
+              <a:rPr lang="en-US" sz="1600" dirty="0">
+                <a:solidFill>
+                  <a:schemeClr val="bg1"/>
+                </a:solidFill>
+              </a:rPr>
+              <a:t>max        95.100000</a:t>
+            </a:r>
+            <a:endParaRPr lang="pt-BR" sz="1600" dirty="0">
+              <a:solidFill>
+                <a:schemeClr val="bg1"/>
+              </a:solidFill>
+            </a:endParaRPr>
+          </a:p>
+        </p:txBody>
+      </p:sp>
+    </p:spTree>
+    <p:extLst>
+      <p:ext uri="{BB962C8B-B14F-4D97-AF65-F5344CB8AC3E}">
+        <p14:creationId xmlns:p14="http://schemas.microsoft.com/office/powerpoint/2010/main" val="4273523214"/>
+      </p:ext>
+    </p:extLst>
+  </p:cSld>
+  <p:clrMapOvr>
+    <a:masterClrMapping/>
+  </p:clrMapOvr>
+  <p:timing>
+    <p:tnLst>
+      <p:par>
+        <p:cTn id="1" dur="indefinite" restart="never" nodeType="tmRoot"/>
+      </p:par>
+    </p:tnLst>
+  </p:timing>
+</p:sld>
+</file>
+
+<file path=ppt/slides/slide4.xml><?xml version="1.0" encoding="utf-8"?>
+<p:sld xmlns:a="http://schemas.openxmlformats.org/drawingml/2006/main" xmlns:r="http://schemas.openxmlformats.org/officeDocument/2006/relationships" xmlns:p="http://schemas.openxmlformats.org/presentationml/2006/main">
+  <p:cSld>
+    <p:spTree>
+      <p:nvGrpSpPr>
+        <p:cNvPr id="1" name=""/>
+        <p:cNvGrpSpPr/>
+        <p:nvPr/>
+      </p:nvGrpSpPr>
+      <p:grpSpPr>
+        <a:xfrm>
+          <a:off x="0" y="0"/>
+          <a:ext cx="0" cy="0"/>
+          <a:chOff x="0" y="0"/>
+          <a:chExt cx="0" cy="0"/>
+        </a:xfrm>
+      </p:grpSpPr>
+      <p:sp>
+        <p:nvSpPr>
+          <p:cNvPr id="2" name="Título 1"/>
+          <p:cNvSpPr>
+            <a:spLocks noGrp="1"/>
+          </p:cNvSpPr>
+          <p:nvPr>
+            <p:ph type="title"/>
+          </p:nvPr>
+        </p:nvSpPr>
+        <p:spPr>
+          <a:xfrm>
+            <a:off x="1141412" y="0"/>
+            <a:ext cx="9905998" cy="1478570"/>
+          </a:xfrm>
+        </p:spPr>
+        <p:txBody>
+          <a:bodyPr/>
+          <a:lstStyle/>
+          <a:p>
+            <a:r>
+              <a:rPr lang="pt-BR" dirty="0" smtClean="0"/>
+              <a:t>Instituições não federais</a:t>
+            </a:r>
+            <a:endParaRPr lang="pt-BR" dirty="0"/>
+          </a:p>
+        </p:txBody>
+      </p:sp>
+      <p:pic>
+        <p:nvPicPr>
+          <p:cNvPr id="4" name="Imagem 3"/>
+          <p:cNvPicPr>
+            <a:picLocks noChangeAspect="1"/>
+          </p:cNvPicPr>
+          <p:nvPr/>
+        </p:nvPicPr>
+        <p:blipFill>
+          <a:blip r:embed="rId2">
+            <a:extLst>
+              <a:ext uri="{28A0092B-C50C-407E-A947-70E740481C1C}">
+                <a14:useLocalDpi xmlns:a14="http://schemas.microsoft.com/office/drawing/2010/main" val="0"/>
+              </a:ext>
+            </a:extLst>
+          </a:blip>
+          <a:stretch>
+            <a:fillRect/>
+          </a:stretch>
+        </p:blipFill>
+        <p:spPr>
+          <a:xfrm>
+            <a:off x="134484" y="1123406"/>
+            <a:ext cx="11928912" cy="5545285"/>
+          </a:xfrm>
+          <a:prstGeom prst="rect">
+            <a:avLst/>
+          </a:prstGeom>
+        </p:spPr>
+      </p:pic>
+      <p:sp>
+        <p:nvSpPr>
+          <p:cNvPr id="5" name="CaixaDeTexto 4"/>
+          <p:cNvSpPr txBox="1"/>
+          <p:nvPr/>
+        </p:nvSpPr>
+        <p:spPr>
+          <a:xfrm>
+            <a:off x="9888583" y="1737360"/>
+            <a:ext cx="2024743" cy="2062103"/>
+          </a:xfrm>
+          <a:prstGeom prst="rect">
+            <a:avLst/>
+          </a:prstGeom>
+          <a:solidFill>
+            <a:schemeClr val="tx1"/>
+          </a:solidFill>
+        </p:spPr>
+        <p:style>
+          <a:lnRef idx="2">
+            <a:schemeClr val="accent2"/>
+          </a:lnRef>
+          <a:fillRef idx="1">
+            <a:schemeClr val="lt1"/>
+          </a:fillRef>
+          <a:effectRef idx="0">
+            <a:schemeClr val="accent2"/>
+          </a:effectRef>
+          <a:fontRef idx="minor">
+            <a:schemeClr val="dk1"/>
+          </a:fontRef>
+        </p:style>
+        <p:txBody>
+          <a:bodyPr wrap="square" rtlCol="0">
+            <a:spAutoFit/>
+          </a:bodyPr>
+          <a:lstStyle/>
+          <a:p>
+            <a:r>
+              <a:rPr lang="en-US" sz="1600" dirty="0"/>
+              <a:t>count    5783.000000</a:t>
+            </a:r>
+          </a:p>
+          <a:p>
+            <a:r>
+              <a:rPr lang="en-US" sz="1600" dirty="0"/>
+              <a:t>mean       39.782812</a:t>
+            </a:r>
+          </a:p>
+          <a:p>
+            <a:r>
+              <a:rPr lang="en-US" sz="1600" dirty="0" err="1"/>
+              <a:t>std</a:t>
+            </a:r>
+            <a:r>
+              <a:rPr lang="en-US" sz="1600" dirty="0"/>
+              <a:t>        12.326573</a:t>
+            </a:r>
+          </a:p>
+          <a:p>
+            <a:r>
+              <a:rPr lang="en-US" sz="1600" dirty="0"/>
+              <a:t>min         0.000000</a:t>
+            </a:r>
+          </a:p>
+          <a:p>
+            <a:r>
+              <a:rPr lang="en-US" sz="1600" dirty="0"/>
+              <a:t>25%        31.400000</a:t>
+            </a:r>
+          </a:p>
+          <a:p>
+            <a:r>
+              <a:rPr lang="en-US" sz="1600" dirty="0"/>
+              <a:t>50%        38.900000</a:t>
+            </a:r>
+          </a:p>
+          <a:p>
+            <a:r>
+              <a:rPr lang="en-US" sz="1600" dirty="0"/>
+              <a:t>75%        47.400000</a:t>
+            </a:r>
+          </a:p>
+          <a:p>
+            <a:r>
+              <a:rPr lang="en-US" sz="1600" dirty="0"/>
+              <a:t>max        93.300000</a:t>
+            </a:r>
+            <a:endParaRPr lang="pt-BR" sz="1600" dirty="0"/>
+          </a:p>
+        </p:txBody>
+      </p:sp>
+    </p:spTree>
+    <p:extLst>
+      <p:ext uri="{BB962C8B-B14F-4D97-AF65-F5344CB8AC3E}">
+        <p14:creationId xmlns:p14="http://schemas.microsoft.com/office/powerpoint/2010/main" val="3643187902"/>
+      </p:ext>
+    </p:extLst>
+  </p:cSld>
+  <p:clrMapOvr>
+    <a:masterClrMapping/>
+  </p:clrMapOvr>
+  <p:timing>
+    <p:tnLst>
+      <p:par>
+        <p:cTn id="1" dur="indefinite" restart="never" nodeType="tmRoot"/>
+      </p:par>
+    </p:tnLst>
+  </p:timing>
+</p:sld>
+</file>
+
+<file path=ppt/slides/slide5.xml><?xml version="1.0" encoding="utf-8"?>
+<p:sld xmlns:a="http://schemas.openxmlformats.org/drawingml/2006/main" xmlns:r="http://schemas.openxmlformats.org/officeDocument/2006/relationships" xmlns:p="http://schemas.openxmlformats.org/presentationml/2006/main">
+  <p:cSld>
+    <p:spTree>
+      <p:nvGrpSpPr>
+        <p:cNvPr id="1" name=""/>
+        <p:cNvGrpSpPr/>
+        <p:nvPr/>
+      </p:nvGrpSpPr>
+      <p:grpSpPr>
+        <a:xfrm>
+          <a:off x="0" y="0"/>
+          <a:ext cx="0" cy="0"/>
+          <a:chOff x="0" y="0"/>
+          <a:chExt cx="0" cy="0"/>
+        </a:xfrm>
+      </p:grpSpPr>
+      <p:sp>
+        <p:nvSpPr>
+          <p:cNvPr id="2" name="Título 1"/>
+          <p:cNvSpPr>
+            <a:spLocks noGrp="1"/>
+          </p:cNvSpPr>
+          <p:nvPr>
+            <p:ph type="title"/>
+          </p:nvPr>
+        </p:nvSpPr>
+        <p:spPr>
+          <a:xfrm>
+            <a:off x="1141412" y="-113002"/>
+            <a:ext cx="9905998" cy="1478570"/>
+          </a:xfrm>
+        </p:spPr>
+        <p:txBody>
+          <a:bodyPr/>
+          <a:lstStyle/>
+          <a:p>
+            <a:r>
+              <a:rPr lang="pt-BR" dirty="0" smtClean="0"/>
+              <a:t>Instituições estaduais</a:t>
+            </a:r>
+            <a:endParaRPr lang="pt-BR" dirty="0"/>
+          </a:p>
+        </p:txBody>
+      </p:sp>
+      <p:pic>
+        <p:nvPicPr>
+          <p:cNvPr id="4" name="Imagem 3"/>
+          <p:cNvPicPr>
+            <a:picLocks noChangeAspect="1"/>
+          </p:cNvPicPr>
+          <p:nvPr/>
+        </p:nvPicPr>
+        <p:blipFill>
+          <a:blip r:embed="rId2">
+            <a:extLst>
+              <a:ext uri="{28A0092B-C50C-407E-A947-70E740481C1C}">
+                <a14:useLocalDpi xmlns:a14="http://schemas.microsoft.com/office/drawing/2010/main" val="0"/>
+              </a:ext>
+            </a:extLst>
+          </a:blip>
+          <a:stretch>
+            <a:fillRect/>
+          </a:stretch>
+        </p:blipFill>
+        <p:spPr>
+          <a:xfrm>
+            <a:off x="107907" y="1175658"/>
+            <a:ext cx="11928910" cy="5545284"/>
+          </a:xfrm>
+          <a:prstGeom prst="rect">
+            <a:avLst/>
+          </a:prstGeom>
+        </p:spPr>
+      </p:pic>
+      <p:sp>
+        <p:nvSpPr>
+          <p:cNvPr id="5" name="CaixaDeTexto 4"/>
+          <p:cNvSpPr txBox="1"/>
+          <p:nvPr/>
+        </p:nvSpPr>
+        <p:spPr>
+          <a:xfrm>
+            <a:off x="9836331" y="1698171"/>
+            <a:ext cx="2103120" cy="2062103"/>
+          </a:xfrm>
+          <a:prstGeom prst="rect">
+            <a:avLst/>
+          </a:prstGeom>
+          <a:solidFill>
+            <a:schemeClr val="tx1"/>
+          </a:solidFill>
+        </p:spPr>
+        <p:style>
+          <a:lnRef idx="2">
+            <a:schemeClr val="accent4"/>
+          </a:lnRef>
+          <a:fillRef idx="1">
+            <a:schemeClr val="lt1"/>
+          </a:fillRef>
+          <a:effectRef idx="0">
+            <a:schemeClr val="accent4"/>
+          </a:effectRef>
+          <a:fontRef idx="minor">
+            <a:schemeClr val="dk1"/>
+          </a:fontRef>
+        </p:style>
+        <p:txBody>
+          <a:bodyPr wrap="square" rtlCol="0">
+            <a:spAutoFit/>
+          </a:bodyPr>
+          <a:lstStyle/>
+          <a:p>
+            <a:r>
+              <a:rPr lang="en-US" sz="1600" dirty="0"/>
+              <a:t>count    970.000000</a:t>
+            </a:r>
+          </a:p>
+          <a:p>
+            <a:r>
+              <a:rPr lang="en-US" sz="1600" dirty="0"/>
+              <a:t>mean      45.210206</a:t>
+            </a:r>
+          </a:p>
+          <a:p>
+            <a:r>
+              <a:rPr lang="en-US" sz="1600" dirty="0" err="1"/>
+              <a:t>std</a:t>
+            </a:r>
+            <a:r>
+              <a:rPr lang="en-US" sz="1600" dirty="0"/>
+              <a:t>       13.429972</a:t>
+            </a:r>
+          </a:p>
+          <a:p>
+            <a:r>
+              <a:rPr lang="en-US" sz="1600" dirty="0"/>
+              <a:t>min        0.000000</a:t>
+            </a:r>
+          </a:p>
+          <a:p>
+            <a:r>
+              <a:rPr lang="en-US" sz="1600" dirty="0"/>
+              <a:t>25%       35.900000</a:t>
+            </a:r>
+          </a:p>
+          <a:p>
+            <a:r>
+              <a:rPr lang="en-US" sz="1600" dirty="0"/>
+              <a:t>50%       44.800000</a:t>
+            </a:r>
+          </a:p>
+          <a:p>
+            <a:r>
+              <a:rPr lang="en-US" sz="1600" dirty="0"/>
+              <a:t>75%       54.500000</a:t>
+            </a:r>
+          </a:p>
+          <a:p>
+            <a:r>
+              <a:rPr lang="en-US" sz="1600" dirty="0"/>
+              <a:t>max       86.500000</a:t>
+            </a:r>
+            <a:endParaRPr lang="pt-BR" sz="1600" dirty="0"/>
+          </a:p>
+        </p:txBody>
+      </p:sp>
+    </p:spTree>
+    <p:extLst>
+      <p:ext uri="{BB962C8B-B14F-4D97-AF65-F5344CB8AC3E}">
+        <p14:creationId xmlns:p14="http://schemas.microsoft.com/office/powerpoint/2010/main" val="397607257"/>
+      </p:ext>
+    </p:extLst>
+  </p:cSld>
+  <p:clrMapOvr>
+    <a:masterClrMapping/>
+  </p:clrMapOvr>
+  <p:timing>
+    <p:tnLst>
+      <p:par>
+        <p:cTn id="1" dur="indefinite" restart="never" nodeType="tmRoot"/>
+      </p:par>
+    </p:tnLst>
+  </p:timing>
+</p:sld>
+</file>
+
+<file path=ppt/slides/slide6.xml><?xml version="1.0" encoding="utf-8"?>
+<p:sld xmlns:a="http://schemas.openxmlformats.org/drawingml/2006/main" xmlns:r="http://schemas.openxmlformats.org/officeDocument/2006/relationships" xmlns:p="http://schemas.openxmlformats.org/presentationml/2006/main">
+  <p:cSld>
+    <p:spTree>
+      <p:nvGrpSpPr>
+        <p:cNvPr id="1" name=""/>
+        <p:cNvGrpSpPr/>
+        <p:nvPr/>
+      </p:nvGrpSpPr>
+      <p:grpSpPr>
+        <a:xfrm>
+          <a:off x="0" y="0"/>
+          <a:ext cx="0" cy="0"/>
+          <a:chOff x="0" y="0"/>
+          <a:chExt cx="0" cy="0"/>
+        </a:xfrm>
+      </p:grpSpPr>
+      <p:sp>
+        <p:nvSpPr>
+          <p:cNvPr id="2" name="Título 1"/>
+          <p:cNvSpPr>
+            <a:spLocks noGrp="1"/>
+          </p:cNvSpPr>
+          <p:nvPr>
+            <p:ph type="title"/>
+          </p:nvPr>
+        </p:nvSpPr>
+        <p:spPr>
+          <a:xfrm>
+            <a:off x="1141412" y="0"/>
+            <a:ext cx="9905998" cy="1478570"/>
+          </a:xfrm>
+        </p:spPr>
+        <p:txBody>
+          <a:bodyPr/>
+          <a:lstStyle/>
+          <a:p>
+            <a:r>
+              <a:rPr lang="pt-BR" dirty="0" smtClean="0"/>
+              <a:t>Instituições privadas lucrativas</a:t>
+            </a:r>
+            <a:endParaRPr lang="pt-BR" dirty="0"/>
+          </a:p>
+        </p:txBody>
+      </p:sp>
+      <p:pic>
+        <p:nvPicPr>
+          <p:cNvPr id="4" name="Imagem 3"/>
+          <p:cNvPicPr>
+            <a:picLocks noChangeAspect="1"/>
+          </p:cNvPicPr>
+          <p:nvPr/>
+        </p:nvPicPr>
+        <p:blipFill>
+          <a:blip r:embed="rId2">
+            <a:extLst>
+              <a:ext uri="{28A0092B-C50C-407E-A947-70E740481C1C}">
+                <a14:useLocalDpi xmlns:a14="http://schemas.microsoft.com/office/drawing/2010/main" val="0"/>
+              </a:ext>
+            </a:extLst>
+          </a:blip>
+          <a:stretch>
+            <a:fillRect/>
+          </a:stretch>
+        </p:blipFill>
+        <p:spPr>
+          <a:xfrm>
+            <a:off x="118995" y="1227910"/>
+            <a:ext cx="11872708" cy="5519158"/>
+          </a:xfrm>
+          <a:prstGeom prst="rect">
+            <a:avLst/>
+          </a:prstGeom>
+        </p:spPr>
+      </p:pic>
+      <p:sp>
+        <p:nvSpPr>
+          <p:cNvPr id="5" name="CaixaDeTexto 4"/>
+          <p:cNvSpPr txBox="1"/>
+          <p:nvPr/>
+        </p:nvSpPr>
+        <p:spPr>
+          <a:xfrm>
+            <a:off x="9366069" y="1789612"/>
+            <a:ext cx="2468880" cy="2127418"/>
+          </a:xfrm>
+          <a:prstGeom prst="rect">
+            <a:avLst/>
+          </a:prstGeom>
+          <a:solidFill>
+            <a:schemeClr val="tx1"/>
+          </a:solidFill>
+        </p:spPr>
+        <p:style>
+          <a:lnRef idx="2">
+            <a:schemeClr val="accent5"/>
+          </a:lnRef>
+          <a:fillRef idx="1">
+            <a:schemeClr val="lt1"/>
+          </a:fillRef>
+          <a:effectRef idx="0">
+            <a:schemeClr val="accent5"/>
+          </a:effectRef>
+          <a:fontRef idx="minor">
+            <a:schemeClr val="dk1"/>
+          </a:fontRef>
+        </p:style>
+        <p:txBody>
+          <a:bodyPr wrap="square" rtlCol="0">
+            <a:spAutoFit/>
+          </a:bodyPr>
+          <a:lstStyle/>
+          <a:p>
+            <a:r>
+              <a:rPr lang="en-US" sz="1600" dirty="0"/>
+              <a:t>count    2094.000000</a:t>
+            </a:r>
+          </a:p>
+          <a:p>
+            <a:r>
+              <a:rPr lang="en-US" sz="1600" dirty="0"/>
+              <a:t>mean       37.584384</a:t>
+            </a:r>
+          </a:p>
+          <a:p>
+            <a:r>
+              <a:rPr lang="en-US" sz="1600" dirty="0" err="1"/>
+              <a:t>std</a:t>
+            </a:r>
+            <a:r>
+              <a:rPr lang="en-US" sz="1600" dirty="0"/>
+              <a:t>        10.722355</a:t>
+            </a:r>
+          </a:p>
+          <a:p>
+            <a:r>
+              <a:rPr lang="en-US" sz="1600" dirty="0"/>
+              <a:t>min         0.000000</a:t>
+            </a:r>
+          </a:p>
+          <a:p>
+            <a:r>
+              <a:rPr lang="en-US" sz="1600" dirty="0"/>
+              <a:t>25%        30.600000</a:t>
+            </a:r>
+          </a:p>
+          <a:p>
+            <a:r>
+              <a:rPr lang="en-US" sz="1600" dirty="0"/>
+              <a:t>50%        36.800000</a:t>
+            </a:r>
+          </a:p>
+          <a:p>
+            <a:r>
+              <a:rPr lang="en-US" sz="1600" dirty="0"/>
+              <a:t>75%        44.200000</a:t>
+            </a:r>
+          </a:p>
+          <a:p>
+            <a:r>
+              <a:rPr lang="en-US" sz="1600" dirty="0"/>
+              <a:t>max        76.000000</a:t>
+            </a:r>
+            <a:endParaRPr lang="pt-BR" sz="1600" dirty="0"/>
+          </a:p>
+        </p:txBody>
+      </p:sp>
+    </p:spTree>
+    <p:extLst>
+      <p:ext uri="{BB962C8B-B14F-4D97-AF65-F5344CB8AC3E}">
+        <p14:creationId xmlns:p14="http://schemas.microsoft.com/office/powerpoint/2010/main" val="103572150"/>
+      </p:ext>
+    </p:extLst>
+  </p:cSld>
+  <p:clrMapOvr>
+    <a:masterClrMapping/>
+  </p:clrMapOvr>
+  <p:timing>
+    <p:tnLst>
+      <p:par>
+        <p:cTn id="1" dur="indefinite" restart="never" nodeType="tmRoot"/>
+      </p:par>
+    </p:tnLst>
+  </p:timing>
+</p:sld>
+</file>
+
+<file path=ppt/slides/slide7.xml><?xml version="1.0" encoding="utf-8"?>
+<p:sld xmlns:a="http://schemas.openxmlformats.org/drawingml/2006/main" xmlns:r="http://schemas.openxmlformats.org/officeDocument/2006/relationships" xmlns:p="http://schemas.openxmlformats.org/presentationml/2006/main">
+  <p:cSld>
+    <p:spTree>
+      <p:nvGrpSpPr>
+        <p:cNvPr id="1" name=""/>
+        <p:cNvGrpSpPr/>
+        <p:nvPr/>
+      </p:nvGrpSpPr>
+      <p:grpSpPr>
+        <a:xfrm>
+          <a:off x="0" y="0"/>
+          <a:ext cx="0" cy="0"/>
+          <a:chOff x="0" y="0"/>
+          <a:chExt cx="0" cy="0"/>
+        </a:xfrm>
+      </p:grpSpPr>
+      <p:sp>
+        <p:nvSpPr>
+          <p:cNvPr id="2" name="Título 1"/>
+          <p:cNvSpPr>
+            <a:spLocks noGrp="1"/>
+          </p:cNvSpPr>
+          <p:nvPr>
+            <p:ph type="title"/>
+          </p:nvPr>
+        </p:nvSpPr>
+        <p:spPr>
+          <a:xfrm>
+            <a:off x="1141413" y="0"/>
+            <a:ext cx="9905998" cy="1478570"/>
+          </a:xfrm>
+        </p:spPr>
+        <p:txBody>
+          <a:bodyPr/>
+          <a:lstStyle/>
+          <a:p>
+            <a:r>
+              <a:rPr lang="pt-BR" dirty="0" smtClean="0"/>
+              <a:t>Instituições Privadas não lucrativas</a:t>
+            </a:r>
+            <a:endParaRPr lang="pt-BR" dirty="0"/>
+          </a:p>
+        </p:txBody>
+      </p:sp>
+      <p:pic>
+        <p:nvPicPr>
+          <p:cNvPr id="4" name="Imagem 3"/>
+          <p:cNvPicPr>
+            <a:picLocks noChangeAspect="1"/>
+          </p:cNvPicPr>
+          <p:nvPr/>
+        </p:nvPicPr>
+        <p:blipFill>
+          <a:blip r:embed="rId2">
+            <a:extLst>
+              <a:ext uri="{28A0092B-C50C-407E-A947-70E740481C1C}">
+                <a14:useLocalDpi xmlns:a14="http://schemas.microsoft.com/office/drawing/2010/main" val="0"/>
+              </a:ext>
+            </a:extLst>
+          </a:blip>
+          <a:stretch>
+            <a:fillRect/>
+          </a:stretch>
+        </p:blipFill>
+        <p:spPr>
+          <a:xfrm>
+            <a:off x="117019" y="1175657"/>
+            <a:ext cx="11900809" cy="5532221"/>
+          </a:xfrm>
+          <a:prstGeom prst="rect">
+            <a:avLst/>
+          </a:prstGeom>
+        </p:spPr>
+      </p:pic>
+      <p:sp>
+        <p:nvSpPr>
+          <p:cNvPr id="5" name="CaixaDeTexto 4"/>
+          <p:cNvSpPr txBox="1"/>
+          <p:nvPr/>
+        </p:nvSpPr>
+        <p:spPr>
+          <a:xfrm>
+            <a:off x="9326880" y="1685109"/>
+            <a:ext cx="2547257" cy="2062103"/>
+          </a:xfrm>
+          <a:prstGeom prst="rect">
+            <a:avLst/>
+          </a:prstGeom>
+          <a:solidFill>
+            <a:schemeClr val="tx1"/>
+          </a:solidFill>
+        </p:spPr>
+        <p:style>
+          <a:lnRef idx="2">
+            <a:schemeClr val="accent2"/>
+          </a:lnRef>
+          <a:fillRef idx="1">
+            <a:schemeClr val="lt1"/>
+          </a:fillRef>
+          <a:effectRef idx="0">
+            <a:schemeClr val="accent2"/>
+          </a:effectRef>
+          <a:fontRef idx="minor">
+            <a:schemeClr val="dk1"/>
+          </a:fontRef>
+        </p:style>
+        <p:txBody>
+          <a:bodyPr wrap="square" rtlCol="0">
+            <a:spAutoFit/>
+          </a:bodyPr>
+          <a:lstStyle/>
+          <a:p>
+            <a:r>
+              <a:rPr lang="en-US" sz="1600" dirty="0"/>
+              <a:t>count    2469.000000</a:t>
+            </a:r>
+          </a:p>
+          <a:p>
+            <a:r>
+              <a:rPr lang="en-US" sz="1600" dirty="0"/>
+              <a:t>mean       39.734305</a:t>
+            </a:r>
+          </a:p>
+          <a:p>
+            <a:r>
+              <a:rPr lang="en-US" sz="1600" dirty="0" err="1"/>
+              <a:t>std</a:t>
+            </a:r>
+            <a:r>
+              <a:rPr lang="en-US" sz="1600" dirty="0"/>
+              <a:t>        12.545465</a:t>
+            </a:r>
+          </a:p>
+          <a:p>
+            <a:r>
+              <a:rPr lang="en-US" sz="1600" dirty="0"/>
+              <a:t>min         0.000000</a:t>
+            </a:r>
+          </a:p>
+          <a:p>
+            <a:r>
+              <a:rPr lang="en-US" sz="1600" dirty="0"/>
+              <a:t>25%        31.100000</a:t>
+            </a:r>
+          </a:p>
+          <a:p>
+            <a:r>
+              <a:rPr lang="en-US" sz="1600" dirty="0"/>
+              <a:t>50%        39.000000</a:t>
+            </a:r>
+          </a:p>
+          <a:p>
+            <a:r>
+              <a:rPr lang="en-US" sz="1600" dirty="0"/>
+              <a:t>75%        47.900000</a:t>
+            </a:r>
+          </a:p>
+          <a:p>
+            <a:r>
+              <a:rPr lang="en-US" sz="1600" dirty="0"/>
+              <a:t>max        93.300000</a:t>
+            </a:r>
+            <a:endParaRPr lang="pt-BR" sz="1600" dirty="0"/>
+          </a:p>
+        </p:txBody>
+      </p:sp>
+    </p:spTree>
+    <p:extLst>
+      <p:ext uri="{BB962C8B-B14F-4D97-AF65-F5344CB8AC3E}">
+        <p14:creationId xmlns:p14="http://schemas.microsoft.com/office/powerpoint/2010/main" val="1517287795"/>
+      </p:ext>
+    </p:extLst>
+  </p:cSld>
+  <p:clrMapOvr>
+    <a:masterClrMapping/>
+  </p:clrMapOvr>
+  <p:timing>
+    <p:tnLst>
+      <p:par>
+        <p:cTn id="1" dur="indefinite" restart="never" nodeType="tmRoot"/>
+      </p:par>
+    </p:tnLst>
+  </p:timing>
+</p:sld>
+</file>
+
+<file path=ppt/slides/slide8.xml><?xml version="1.0" encoding="utf-8"?>
+<p:sld xmlns:a="http://schemas.openxmlformats.org/drawingml/2006/main" xmlns:r="http://schemas.openxmlformats.org/officeDocument/2006/relationships" xmlns:p="http://schemas.openxmlformats.org/presentationml/2006/main">
+  <p:cSld>
+    <p:spTree>
+      <p:nvGrpSpPr>
+        <p:cNvPr id="1" name=""/>
+        <p:cNvGrpSpPr/>
+        <p:nvPr/>
+      </p:nvGrpSpPr>
+      <p:grpSpPr>
+        <a:xfrm>
+          <a:off x="0" y="0"/>
+          <a:ext cx="0" cy="0"/>
+          <a:chOff x="0" y="0"/>
+          <a:chExt cx="0" cy="0"/>
+        </a:xfrm>
+      </p:grpSpPr>
+      <p:sp>
+        <p:nvSpPr>
+          <p:cNvPr id="2" name="Título 1"/>
+          <p:cNvSpPr>
+            <a:spLocks noGrp="1"/>
+          </p:cNvSpPr>
+          <p:nvPr>
+            <p:ph type="title"/>
+          </p:nvPr>
+        </p:nvSpPr>
+        <p:spPr>
+          <a:xfrm>
+            <a:off x="2153629" y="67235"/>
+            <a:ext cx="7881563" cy="1250576"/>
+          </a:xfrm>
+        </p:spPr>
+        <p:txBody>
+          <a:bodyPr/>
+          <a:lstStyle/>
+          <a:p>
+            <a:r>
+              <a:rPr lang="pt-BR" dirty="0" smtClean="0"/>
+              <a:t>Instituições </a:t>
+            </a:r>
+            <a:r>
+              <a:rPr lang="pt-BR" dirty="0" smtClean="0"/>
+              <a:t>federais e não federais</a:t>
+            </a:r>
+            <a:endParaRPr lang="pt-BR" dirty="0"/>
+          </a:p>
+        </p:txBody>
+      </p:sp>
+      <p:pic>
+        <p:nvPicPr>
+          <p:cNvPr id="3" name="Imagem 2"/>
+          <p:cNvPicPr>
+            <a:picLocks noChangeAspect="1"/>
+          </p:cNvPicPr>
+          <p:nvPr/>
+        </p:nvPicPr>
+        <p:blipFill>
+          <a:blip r:embed="rId2">
+            <a:extLst>
+              <a:ext uri="{28A0092B-C50C-407E-A947-70E740481C1C}">
+                <a14:useLocalDpi xmlns:a14="http://schemas.microsoft.com/office/drawing/2010/main" val="0"/>
+              </a:ext>
+            </a:extLst>
+          </a:blip>
+          <a:stretch>
+            <a:fillRect/>
+          </a:stretch>
+        </p:blipFill>
+        <p:spPr>
+          <a:xfrm>
+            <a:off x="2443222" y="1478570"/>
+            <a:ext cx="7302379" cy="4868252"/>
+          </a:xfrm>
+          <a:prstGeom prst="rect">
+            <a:avLst/>
+          </a:prstGeom>
+        </p:spPr>
+      </p:pic>
+    </p:spTree>
+    <p:extLst>
+      <p:ext uri="{BB962C8B-B14F-4D97-AF65-F5344CB8AC3E}">
+        <p14:creationId xmlns:p14="http://schemas.microsoft.com/office/powerpoint/2010/main" val="3367810686"/>
+      </p:ext>
+    </p:extLst>
+  </p:cSld>
+  <p:clrMapOvr>
+    <a:masterClrMapping/>
+  </p:clrMapOvr>
+  <p:timing>
+    <p:tnLst>
+      <p:par>
+        <p:cTn id="1" dur="indefinite" restart="never" nodeType="tmRoot"/>
+      </p:par>
+    </p:tnLst>
+  </p:timing>
+</p:sld>
+</file>
+
+<file path=ppt/slides/slide9.xml><?xml version="1.0" encoding="utf-8"?>
+<p:sld xmlns:a="http://schemas.openxmlformats.org/drawingml/2006/main" xmlns:r="http://schemas.openxmlformats.org/officeDocument/2006/relationships" xmlns:p="http://schemas.openxmlformats.org/presentationml/2006/main">
+  <p:cSld>
+    <p:spTree>
+      <p:nvGrpSpPr>
+        <p:cNvPr id="1" name=""/>
+        <p:cNvGrpSpPr/>
+        <p:nvPr/>
+      </p:nvGrpSpPr>
+      <p:grpSpPr>
+        <a:xfrm>
+          <a:off x="0" y="0"/>
+          <a:ext cx="0" cy="0"/>
+          <a:chOff x="0" y="0"/>
+          <a:chExt cx="0" cy="0"/>
+        </a:xfrm>
+      </p:grpSpPr>
+      <p:sp>
+        <p:nvSpPr>
+          <p:cNvPr id="2" name="Título 1"/>
+          <p:cNvSpPr>
+            <a:spLocks noGrp="1"/>
+          </p:cNvSpPr>
+          <p:nvPr>
+            <p:ph type="title"/>
+          </p:nvPr>
+        </p:nvSpPr>
+        <p:spPr>
+          <a:xfrm>
+            <a:off x="2597383" y="134470"/>
+            <a:ext cx="7116840" cy="1250576"/>
+          </a:xfrm>
+        </p:spPr>
+        <p:txBody>
+          <a:bodyPr/>
+          <a:lstStyle/>
+          <a:p>
+            <a:r>
+              <a:rPr lang="pt-BR" dirty="0" smtClean="0"/>
+              <a:t>Instituições </a:t>
+            </a:r>
+            <a:r>
+              <a:rPr lang="pt-BR" dirty="0" smtClean="0"/>
+              <a:t>federais e estaduais</a:t>
+            </a:r>
+            <a:endParaRPr lang="pt-BR" dirty="0"/>
+          </a:p>
+        </p:txBody>
+      </p:sp>
+      <p:pic>
+        <p:nvPicPr>
+          <p:cNvPr id="4" name="Imagem 3"/>
+          <p:cNvPicPr>
+            <a:picLocks noChangeAspect="1"/>
+          </p:cNvPicPr>
+          <p:nvPr/>
+        </p:nvPicPr>
+        <p:blipFill>
+          <a:blip r:embed="rId2">
+            <a:extLst>
+              <a:ext uri="{28A0092B-C50C-407E-A947-70E740481C1C}">
+                <a14:useLocalDpi xmlns:a14="http://schemas.microsoft.com/office/drawing/2010/main" val="0"/>
+              </a:ext>
+            </a:extLst>
+          </a:blip>
+          <a:stretch>
+            <a:fillRect/>
+          </a:stretch>
+        </p:blipFill>
+        <p:spPr>
+          <a:xfrm>
+            <a:off x="2474597" y="1519101"/>
+            <a:ext cx="7239625" cy="4826416"/>
+          </a:xfrm>
+          <a:prstGeom prst="rect">
+            <a:avLst/>
+          </a:prstGeom>
+        </p:spPr>
+      </p:pic>
+    </p:spTree>
+    <p:extLst>
+      <p:ext uri="{BB962C8B-B14F-4D97-AF65-F5344CB8AC3E}">
+        <p14:creationId xmlns:p14="http://schemas.microsoft.com/office/powerpoint/2010/main" val="3313956663"/>
       </p:ext>
     </p:extLst>
   </p:cSld>

</xml_diff>